<commit_message>
Fix stamps and diagrams titles
</commit_message>
<xml_diff>
--- a/diagrams/results.pptx
+++ b/diagrams/results.pptx
@@ -1,21 +1,118 @@
 
 <file path=ppt/presentation.xml><?xml version="1.0" encoding="utf-8"?>
-<p:presentation xmlns:a="http://schemas.openxmlformats.org/drawingml/2006/main" xmlns:p="http://schemas.openxmlformats.org/presentationml/2006/main" xmlns:r="http://schemas.openxmlformats.org/officeDocument/2006/relationships" xmlns:p14="http://schemas.microsoft.com/office/powerpoint/2010/main" xmlns:p15="http://schemas.microsoft.com/office/powerpoint/2012/main" xmlns:mc="http://schemas.openxmlformats.org/markup-compatibility/2006">
+<p:presentation xmlns:a="http://schemas.openxmlformats.org/drawingml/2006/main" xmlns:r="http://schemas.openxmlformats.org/officeDocument/2006/relationships" xmlns:p="http://schemas.openxmlformats.org/presentationml/2006/main" saveSubsetFonts="1">
   <p:sldMasterIdLst>
-    <p:sldMasterId id="2147483648" r:id="rId2"/>
+    <p:sldMasterId id="2147483648" r:id="rId1"/>
   </p:sldMasterIdLst>
   <p:sldIdLst>
-    <p:sldId id="256" r:id="rId3"/>
+    <p:sldId id="256" r:id="rId2"/>
   </p:sldIdLst>
   <p:sldSz cx="30267275" cy="21396325"/>
   <p:notesSz cx="7772400" cy="10058400"/>
+  <p:defaultTextStyle>
+    <a:defPPr>
+      <a:defRPr lang="en-US"/>
+    </a:defPPr>
+    <a:lvl1pPr marL="0" algn="l" defTabSz="914400" rtl="0" eaLnBrk="1" latinLnBrk="0" hangingPunct="1">
+      <a:defRPr sz="1800" kern="1200">
+        <a:solidFill>
+          <a:schemeClr val="tx1"/>
+        </a:solidFill>
+        <a:latin typeface="+mn-lt"/>
+        <a:ea typeface="+mn-ea"/>
+        <a:cs typeface="+mn-cs"/>
+      </a:defRPr>
+    </a:lvl1pPr>
+    <a:lvl2pPr marL="457200" algn="l" defTabSz="914400" rtl="0" eaLnBrk="1" latinLnBrk="0" hangingPunct="1">
+      <a:defRPr sz="1800" kern="1200">
+        <a:solidFill>
+          <a:schemeClr val="tx1"/>
+        </a:solidFill>
+        <a:latin typeface="+mn-lt"/>
+        <a:ea typeface="+mn-ea"/>
+        <a:cs typeface="+mn-cs"/>
+      </a:defRPr>
+    </a:lvl2pPr>
+    <a:lvl3pPr marL="914400" algn="l" defTabSz="914400" rtl="0" eaLnBrk="1" latinLnBrk="0" hangingPunct="1">
+      <a:defRPr sz="1800" kern="1200">
+        <a:solidFill>
+          <a:schemeClr val="tx1"/>
+        </a:solidFill>
+        <a:latin typeface="+mn-lt"/>
+        <a:ea typeface="+mn-ea"/>
+        <a:cs typeface="+mn-cs"/>
+      </a:defRPr>
+    </a:lvl3pPr>
+    <a:lvl4pPr marL="1371600" algn="l" defTabSz="914400" rtl="0" eaLnBrk="1" latinLnBrk="0" hangingPunct="1">
+      <a:defRPr sz="1800" kern="1200">
+        <a:solidFill>
+          <a:schemeClr val="tx1"/>
+        </a:solidFill>
+        <a:latin typeface="+mn-lt"/>
+        <a:ea typeface="+mn-ea"/>
+        <a:cs typeface="+mn-cs"/>
+      </a:defRPr>
+    </a:lvl4pPr>
+    <a:lvl5pPr marL="1828800" algn="l" defTabSz="914400" rtl="0" eaLnBrk="1" latinLnBrk="0" hangingPunct="1">
+      <a:defRPr sz="1800" kern="1200">
+        <a:solidFill>
+          <a:schemeClr val="tx1"/>
+        </a:solidFill>
+        <a:latin typeface="+mn-lt"/>
+        <a:ea typeface="+mn-ea"/>
+        <a:cs typeface="+mn-cs"/>
+      </a:defRPr>
+    </a:lvl5pPr>
+    <a:lvl6pPr marL="2286000" algn="l" defTabSz="914400" rtl="0" eaLnBrk="1" latinLnBrk="0" hangingPunct="1">
+      <a:defRPr sz="1800" kern="1200">
+        <a:solidFill>
+          <a:schemeClr val="tx1"/>
+        </a:solidFill>
+        <a:latin typeface="+mn-lt"/>
+        <a:ea typeface="+mn-ea"/>
+        <a:cs typeface="+mn-cs"/>
+      </a:defRPr>
+    </a:lvl6pPr>
+    <a:lvl7pPr marL="2743200" algn="l" defTabSz="914400" rtl="0" eaLnBrk="1" latinLnBrk="0" hangingPunct="1">
+      <a:defRPr sz="1800" kern="1200">
+        <a:solidFill>
+          <a:schemeClr val="tx1"/>
+        </a:solidFill>
+        <a:latin typeface="+mn-lt"/>
+        <a:ea typeface="+mn-ea"/>
+        <a:cs typeface="+mn-cs"/>
+      </a:defRPr>
+    </a:lvl7pPr>
+    <a:lvl8pPr marL="3200400" algn="l" defTabSz="914400" rtl="0" eaLnBrk="1" latinLnBrk="0" hangingPunct="1">
+      <a:defRPr sz="1800" kern="1200">
+        <a:solidFill>
+          <a:schemeClr val="tx1"/>
+        </a:solidFill>
+        <a:latin typeface="+mn-lt"/>
+        <a:ea typeface="+mn-ea"/>
+        <a:cs typeface="+mn-cs"/>
+      </a:defRPr>
+    </a:lvl8pPr>
+    <a:lvl9pPr marL="3657600" algn="l" defTabSz="914400" rtl="0" eaLnBrk="1" latinLnBrk="0" hangingPunct="1">
+      <a:defRPr sz="1800" kern="1200">
+        <a:solidFill>
+          <a:schemeClr val="tx1"/>
+        </a:solidFill>
+        <a:latin typeface="+mn-lt"/>
+        <a:ea typeface="+mn-ea"/>
+        <a:cs typeface="+mn-cs"/>
+      </a:defRPr>
+    </a:lvl9pPr>
+  </p:defaultTextStyle>
 </p:presentation>
 </file>
 
 <file path=ppt/charts/chart1.xml><?xml version="1.0" encoding="utf-8"?>
 <c:chartSpace xmlns:c="http://schemas.openxmlformats.org/drawingml/2006/chart" xmlns:a="http://schemas.openxmlformats.org/drawingml/2006/main" xmlns:r="http://schemas.openxmlformats.org/officeDocument/2006/relationships">
+  <c:date1904 val="1"/>
   <c:lang val="en-US"/>
   <c:roundedCorners val="0"/>
+  <c:style val="18"/>
   <c:chart>
     <c:title>
       <c:tx>
@@ -24,26 +121,26 @@
           <a:lstStyle/>
           <a:p>
             <a:pPr>
-              <a:defRPr b="0" sz="2800" spc="-1" strike="noStrike">
+              <a:defRPr sz="2800" b="0" strike="noStrike" spc="-1">
                 <a:solidFill>
                   <a:srgbClr val="595959"/>
                 </a:solidFill>
                 <a:uFill>
                   <a:solidFill>
-                    <a:srgbClr val="ffffff"/>
+                    <a:srgbClr val="FFFFFF"/>
                   </a:solidFill>
                 </a:uFill>
                 <a:latin typeface="Calibri"/>
               </a:defRPr>
             </a:pPr>
             <a:r>
-              <a:rPr b="0" sz="2800" spc="-1" strike="noStrike">
+              <a:rPr lang="ru-RU" sz="2800" b="0" strike="noStrike" spc="-1">
                 <a:solidFill>
                   <a:srgbClr val="595959"/>
                 </a:solidFill>
                 <a:uFill>
                   <a:solidFill>
-                    <a:srgbClr val="ffffff"/>
+                    <a:srgbClr val="FFFFFF"/>
                   </a:solidFill>
                 </a:uFill>
                 <a:latin typeface="Calibri"/>
@@ -65,6 +162,7 @@
     </c:title>
     <c:autoTitleDeleted val="0"/>
     <c:plotArea>
+      <c:layout/>
       <c:barChart>
         <c:barDir val="col"/>
         <c:grouping val="clustered"/>
@@ -85,24 +183,37 @@
           </c:tx>
           <c:spPr>
             <a:solidFill>
-              <a:srgbClr val="a5a5a5"/>
+              <a:srgbClr val="A5A5A5"/>
             </a:solidFill>
             <a:ln w="19080">
               <a:solidFill>
-                <a:srgbClr val="ffffff"/>
+                <a:srgbClr val="FFFFFF"/>
               </a:solidFill>
               <a:round/>
             </a:ln>
           </c:spPr>
           <c:invertIfNegative val="0"/>
           <c:dLbls>
+            <c:spPr>
+              <a:noFill/>
+              <a:ln>
+                <a:noFill/>
+              </a:ln>
+              <a:effectLst/>
+            </c:spPr>
             <c:dLblPos val="outEnd"/>
             <c:showLegendKey val="0"/>
             <c:showVal val="0"/>
             <c:showCatName val="0"/>
             <c:showSerName val="0"/>
             <c:showPercent val="0"/>
+            <c:showBubbleSize val="1"/>
             <c:showLeaderLines val="0"/>
+            <c:extLst>
+              <c:ext xmlns:c15="http://schemas.microsoft.com/office/drawing/2012/chart" uri="{CE6537A1-D6FC-4f65-9D91-7224C49458BB}">
+                <c15:showLeaderLines val="0"/>
+              </c:ext>
+            </c:extLst>
           </c:dLbls>
           <c:cat>
             <c:strRef>
@@ -167,64 +278,71 @@
                 <c:formatCode>General</c:formatCode>
                 <c:ptCount val="16"/>
                 <c:pt idx="0">
-                  <c:v>89</c:v>
+                  <c:v>89.0</c:v>
                 </c:pt>
                 <c:pt idx="1">
-                  <c:v>98</c:v>
+                  <c:v>98.0</c:v>
                 </c:pt>
                 <c:pt idx="2">
-                  <c:v>101</c:v>
+                  <c:v>101.0</c:v>
                 </c:pt>
                 <c:pt idx="3">
-                  <c:v>91</c:v>
+                  <c:v>91.0</c:v>
                 </c:pt>
                 <c:pt idx="4">
-                  <c:v>98</c:v>
+                  <c:v>98.0</c:v>
                 </c:pt>
                 <c:pt idx="5">
-                  <c:v>94</c:v>
+                  <c:v>94.0</c:v>
                 </c:pt>
                 <c:pt idx="6">
-                  <c:v>92</c:v>
+                  <c:v>92.0</c:v>
                 </c:pt>
                 <c:pt idx="7">
-                  <c:v>92</c:v>
+                  <c:v>92.0</c:v>
                 </c:pt>
                 <c:pt idx="8">
-                  <c:v>91</c:v>
+                  <c:v>91.0</c:v>
                 </c:pt>
                 <c:pt idx="9">
-                  <c:v>97</c:v>
+                  <c:v>97.0</c:v>
                 </c:pt>
                 <c:pt idx="10">
-                  <c:v>90</c:v>
+                  <c:v>90.0</c:v>
                 </c:pt>
                 <c:pt idx="11">
-                  <c:v>93</c:v>
+                  <c:v>93.0</c:v>
                 </c:pt>
                 <c:pt idx="12">
-                  <c:v>92</c:v>
+                  <c:v>92.0</c:v>
                 </c:pt>
                 <c:pt idx="13">
-                  <c:v>90</c:v>
+                  <c:v>90.0</c:v>
                 </c:pt>
                 <c:pt idx="14">
-                  <c:v>96</c:v>
+                  <c:v>96.0</c:v>
                 </c:pt>
                 <c:pt idx="15">
-                  <c:v>96</c:v>
+                  <c:v>96.0</c:v>
                 </c:pt>
               </c:numCache>
             </c:numRef>
           </c:val>
         </c:ser>
+        <c:dLbls>
+          <c:showLegendKey val="0"/>
+          <c:showVal val="0"/>
+          <c:showCatName val="0"/>
+          <c:showSerName val="0"/>
+          <c:showPercent val="0"/>
+          <c:showBubbleSize val="0"/>
+        </c:dLbls>
         <c:gapWidth val="0"/>
-        <c:overlap val="0"/>
-        <c:axId val="1672260"/>
-        <c:axId val="52698826"/>
+        <c:axId val="2131526640"/>
+        <c:axId val="-2145646128"/>
       </c:barChart>
       <c:catAx>
-        <c:axId val="1672260"/>
+        <c:axId val="2131526640"/>
         <c:scaling>
           <c:orientation val="minMax"/>
         </c:scaling>
@@ -237,26 +355,26 @@
               <a:lstStyle/>
               <a:p>
                 <a:pPr>
-                  <a:defRPr b="0" sz="2400" spc="-1" strike="noStrike">
+                  <a:defRPr sz="2400" b="0" strike="noStrike" spc="-1">
                     <a:solidFill>
                       <a:srgbClr val="595959"/>
                     </a:solidFill>
                     <a:uFill>
                       <a:solidFill>
-                        <a:srgbClr val="ffffff"/>
+                        <a:srgbClr val="FFFFFF"/>
                       </a:solidFill>
                     </a:uFill>
                     <a:latin typeface="Calibri"/>
                   </a:defRPr>
                 </a:pPr>
                 <a:r>
-                  <a:rPr b="0" sz="2400" spc="-1" strike="noStrike">
+                  <a:rPr lang="ru-RU" sz="2400" b="0" strike="noStrike" spc="-1">
                     <a:solidFill>
                       <a:srgbClr val="595959"/>
                     </a:solidFill>
                     <a:uFill>
                       <a:solidFill>
-                        <a:srgbClr val="ffffff"/>
+                        <a:srgbClr val="FFFFFF"/>
                       </a:solidFill>
                     </a:uFill>
                     <a:latin typeface="Calibri"/>
@@ -266,49 +384,53 @@
               </a:p>
             </c:rich>
           </c:tx>
+          <c:layout/>
           <c:overlay val="0"/>
         </c:title>
-        <c:numFmt formatCode="DD/MM/YYYY" sourceLinked="1"/>
+        <c:numFmt formatCode="General" sourceLinked="1"/>
         <c:majorTickMark val="none"/>
         <c:minorTickMark val="none"/>
         <c:tickLblPos val="nextTo"/>
         <c:spPr>
           <a:ln w="9360">
             <a:solidFill>
-              <a:srgbClr val="d9d9d9"/>
+              <a:srgbClr val="D9D9D9"/>
             </a:solidFill>
             <a:round/>
           </a:ln>
         </c:spPr>
         <c:txPr>
           <a:bodyPr/>
+          <a:lstStyle/>
           <a:p>
             <a:pPr>
-              <a:defRPr b="0" sz="2400" spc="-1" strike="noStrike">
+              <a:defRPr sz="2400" b="0" strike="noStrike" spc="-1">
                 <a:solidFill>
                   <a:srgbClr val="595959"/>
                 </a:solidFill>
                 <a:uFill>
                   <a:solidFill>
-                    <a:srgbClr val="ffffff"/>
+                    <a:srgbClr val="FFFFFF"/>
                   </a:solidFill>
                 </a:uFill>
                 <a:latin typeface="Calibri"/>
               </a:defRPr>
             </a:pPr>
+            <a:endParaRPr lang="en-US"/>
           </a:p>
         </c:txPr>
-        <c:crossAx val="52698826"/>
+        <c:crossAx val="-2145646128"/>
         <c:crosses val="autoZero"/>
         <c:auto val="1"/>
         <c:lblAlgn val="ctr"/>
         <c:lblOffset val="100"/>
+        <c:noMultiLvlLbl val="1"/>
       </c:catAx>
       <c:valAx>
-        <c:axId val="52698826"/>
+        <c:axId val="-2145646128"/>
         <c:scaling>
           <c:orientation val="minMax"/>
-          <c:min val="0"/>
+          <c:min val="0.0"/>
         </c:scaling>
         <c:delete val="0"/>
         <c:axPos val="l"/>
@@ -319,26 +441,26 @@
               <a:lstStyle/>
               <a:p>
                 <a:pPr>
-                  <a:defRPr b="0" sz="2400" spc="-1" strike="noStrike">
+                  <a:defRPr sz="2400" b="0" strike="noStrike" spc="-1">
                     <a:solidFill>
                       <a:srgbClr val="595959"/>
                     </a:solidFill>
                     <a:uFill>
                       <a:solidFill>
-                        <a:srgbClr val="ffffff"/>
+                        <a:srgbClr val="FFFFFF"/>
                       </a:solidFill>
                     </a:uFill>
                     <a:latin typeface="Calibri"/>
                   </a:defRPr>
                 </a:pPr>
                 <a:r>
-                  <a:rPr b="0" sz="2400" spc="-1" strike="noStrike">
+                  <a:rPr lang="bg-BG" sz="2400" b="0" strike="noStrike" spc="-1">
                     <a:solidFill>
                       <a:srgbClr val="595959"/>
                     </a:solidFill>
                     <a:uFill>
                       <a:solidFill>
-                        <a:srgbClr val="ffffff"/>
+                        <a:srgbClr val="FFFFFF"/>
                       </a:solidFill>
                     </a:uFill>
                     <a:latin typeface="Calibri"/>
@@ -348,6 +470,7 @@
               </a:p>
             </c:rich>
           </c:tx>
+          <c:layout/>
           <c:overlay val="0"/>
         </c:title>
         <c:numFmt formatCode="General" sourceLinked="0"/>
@@ -361,24 +484,27 @@
         </c:spPr>
         <c:txPr>
           <a:bodyPr/>
+          <a:lstStyle/>
           <a:p>
             <a:pPr>
-              <a:defRPr b="0" sz="2400" spc="-1" strike="noStrike">
+              <a:defRPr sz="2400" b="0" strike="noStrike" spc="-1">
                 <a:solidFill>
                   <a:srgbClr val="595959"/>
                 </a:solidFill>
                 <a:uFill>
                   <a:solidFill>
-                    <a:srgbClr val="ffffff"/>
+                    <a:srgbClr val="FFFFFF"/>
                   </a:solidFill>
                 </a:uFill>
                 <a:latin typeface="Calibri"/>
               </a:defRPr>
             </a:pPr>
+            <a:endParaRPr lang="en-US"/>
           </a:p>
         </c:txPr>
-        <c:crossAx val="1672260"/>
+        <c:crossAx val="2131526640"/>
         <c:crosses val="autoZero"/>
+        <c:crossBetween val="between"/>
       </c:valAx>
       <c:spPr>
         <a:noFill/>
@@ -389,6 +515,7 @@
     </c:plotArea>
     <c:plotVisOnly val="1"/>
     <c:dispBlanksAs val="gap"/>
+    <c:showDLblsOverMax val="1"/>
   </c:chart>
   <c:spPr>
     <a:noFill/>
@@ -400,7 +527,7 @@
 </file>
 
 <file path=ppt/slideLayouts/slideLayout1.xml><?xml version="1.0" encoding="utf-8"?>
-<p:sldLayout xmlns:a="http://schemas.openxmlformats.org/drawingml/2006/main" xmlns:p="http://schemas.openxmlformats.org/presentationml/2006/main" xmlns:r="http://schemas.openxmlformats.org/officeDocument/2006/relationships" xmlns:p14="http://schemas.microsoft.com/office/powerpoint/2010/main" xmlns:p15="http://schemas.microsoft.com/office/powerpoint/2012/main" xmlns:mc="http://schemas.openxmlformats.org/markup-compatibility/2006" type="blank" preserve="1">
+<p:sldLayout xmlns:a="http://schemas.openxmlformats.org/drawingml/2006/main" xmlns:r="http://schemas.openxmlformats.org/officeDocument/2006/relationships" xmlns:p="http://schemas.openxmlformats.org/presentationml/2006/main" type="blank" preserve="1">
   <p:cSld name="Blank Slide">
     <p:spTree>
       <p:nvGrpSpPr>
@@ -418,11 +545,14 @@
       </p:grpSpPr>
     </p:spTree>
   </p:cSld>
+  <p:clrMapOvr>
+    <a:masterClrMapping/>
+  </p:clrMapOvr>
 </p:sldLayout>
 </file>
 
 <file path=ppt/slideLayouts/slideLayout10.xml><?xml version="1.0" encoding="utf-8"?>
-<p:sldLayout xmlns:a="http://schemas.openxmlformats.org/drawingml/2006/main" xmlns:p="http://schemas.openxmlformats.org/presentationml/2006/main" xmlns:r="http://schemas.openxmlformats.org/officeDocument/2006/relationships" xmlns:p14="http://schemas.microsoft.com/office/powerpoint/2010/main" xmlns:p15="http://schemas.microsoft.com/office/powerpoint/2012/main" xmlns:mc="http://schemas.openxmlformats.org/markup-compatibility/2006" type="objOverTx" preserve="1">
+<p:sldLayout xmlns:a="http://schemas.openxmlformats.org/drawingml/2006/main" xmlns:r="http://schemas.openxmlformats.org/officeDocument/2006/relationships" xmlns:p="http://schemas.openxmlformats.org/presentationml/2006/main" type="objOverTx" preserve="1">
   <p:cSld name="Title, Content over Content">
     <p:spTree>
       <p:nvGrpSpPr>
@@ -458,15 +588,16 @@
           </a:prstGeom>
         </p:spPr>
         <p:txBody>
-          <a:bodyPr lIns="0" rIns="0" tIns="0" bIns="0" anchor="ctr"/>
+          <a:bodyPr lIns="0" tIns="0" rIns="0" bIns="0" anchor="ctr"/>
+          <a:lstStyle/>
           <a:p>
-            <a:endParaRPr b="0" lang="en-US" sz="4880" spc="-1" strike="noStrike">
+            <a:endParaRPr lang="en-US" sz="4880" b="0" strike="noStrike" spc="-1">
               <a:solidFill>
                 <a:srgbClr val="000000"/>
               </a:solidFill>
               <a:uFill>
                 <a:solidFill>
-                  <a:srgbClr val="ffffff"/>
+                  <a:srgbClr val="FFFFFF"/>
                 </a:solidFill>
               </a:uFill>
               <a:latin typeface="Calibri"/>
@@ -494,15 +625,16 @@
           </a:prstGeom>
         </p:spPr>
         <p:txBody>
-          <a:bodyPr lIns="0" rIns="0" tIns="0" bIns="0"/>
+          <a:bodyPr lIns="0" tIns="0" rIns="0" bIns="0"/>
+          <a:lstStyle/>
           <a:p>
-            <a:endParaRPr b="0" lang="en-US" sz="8740" spc="-1" strike="noStrike">
+            <a:endParaRPr lang="en-US" sz="8740" b="0" strike="noStrike" spc="-1">
               <a:solidFill>
                 <a:srgbClr val="000000"/>
               </a:solidFill>
               <a:uFill>
                 <a:solidFill>
-                  <a:srgbClr val="ffffff"/>
+                  <a:srgbClr val="FFFFFF"/>
                 </a:solidFill>
               </a:uFill>
               <a:latin typeface="Calibri"/>
@@ -530,15 +662,16 @@
           </a:prstGeom>
         </p:spPr>
         <p:txBody>
-          <a:bodyPr lIns="0" rIns="0" tIns="0" bIns="0"/>
+          <a:bodyPr lIns="0" tIns="0" rIns="0" bIns="0"/>
+          <a:lstStyle/>
           <a:p>
-            <a:endParaRPr b="0" lang="en-US" sz="8740" spc="-1" strike="noStrike">
+            <a:endParaRPr lang="en-US" sz="8740" b="0" strike="noStrike" spc="-1">
               <a:solidFill>
                 <a:srgbClr val="000000"/>
               </a:solidFill>
               <a:uFill>
                 <a:solidFill>
-                  <a:srgbClr val="ffffff"/>
+                  <a:srgbClr val="FFFFFF"/>
                 </a:solidFill>
               </a:uFill>
               <a:latin typeface="Calibri"/>
@@ -548,11 +681,14 @@
       </p:sp>
     </p:spTree>
   </p:cSld>
+  <p:clrMapOvr>
+    <a:masterClrMapping/>
+  </p:clrMapOvr>
 </p:sldLayout>
 </file>
 
 <file path=ppt/slideLayouts/slideLayout11.xml><?xml version="1.0" encoding="utf-8"?>
-<p:sldLayout xmlns:a="http://schemas.openxmlformats.org/drawingml/2006/main" xmlns:p="http://schemas.openxmlformats.org/presentationml/2006/main" xmlns:r="http://schemas.openxmlformats.org/officeDocument/2006/relationships" xmlns:p14="http://schemas.microsoft.com/office/powerpoint/2010/main" xmlns:p15="http://schemas.microsoft.com/office/powerpoint/2012/main" xmlns:mc="http://schemas.openxmlformats.org/markup-compatibility/2006" type="fourObj" preserve="1">
+<p:sldLayout xmlns:a="http://schemas.openxmlformats.org/drawingml/2006/main" xmlns:r="http://schemas.openxmlformats.org/officeDocument/2006/relationships" xmlns:p="http://schemas.openxmlformats.org/presentationml/2006/main" type="fourObj" preserve="1">
   <p:cSld name="Title, 4 Content">
     <p:spTree>
       <p:nvGrpSpPr>
@@ -588,15 +724,16 @@
           </a:prstGeom>
         </p:spPr>
         <p:txBody>
-          <a:bodyPr lIns="0" rIns="0" tIns="0" bIns="0" anchor="ctr"/>
+          <a:bodyPr lIns="0" tIns="0" rIns="0" bIns="0" anchor="ctr"/>
+          <a:lstStyle/>
           <a:p>
-            <a:endParaRPr b="0" lang="en-US" sz="4880" spc="-1" strike="noStrike">
+            <a:endParaRPr lang="en-US" sz="4880" b="0" strike="noStrike" spc="-1">
               <a:solidFill>
                 <a:srgbClr val="000000"/>
               </a:solidFill>
               <a:uFill>
                 <a:solidFill>
-                  <a:srgbClr val="ffffff"/>
+                  <a:srgbClr val="FFFFFF"/>
                 </a:solidFill>
               </a:uFill>
               <a:latin typeface="Calibri"/>
@@ -624,15 +761,16 @@
           </a:prstGeom>
         </p:spPr>
         <p:txBody>
-          <a:bodyPr lIns="0" rIns="0" tIns="0" bIns="0"/>
+          <a:bodyPr lIns="0" tIns="0" rIns="0" bIns="0"/>
+          <a:lstStyle/>
           <a:p>
-            <a:endParaRPr b="0" lang="en-US" sz="8740" spc="-1" strike="noStrike">
+            <a:endParaRPr lang="en-US" sz="8740" b="0" strike="noStrike" spc="-1">
               <a:solidFill>
                 <a:srgbClr val="000000"/>
               </a:solidFill>
               <a:uFill>
                 <a:solidFill>
-                  <a:srgbClr val="ffffff"/>
+                  <a:srgbClr val="FFFFFF"/>
                 </a:solidFill>
               </a:uFill>
               <a:latin typeface="Calibri"/>
@@ -660,15 +798,16 @@
           </a:prstGeom>
         </p:spPr>
         <p:txBody>
-          <a:bodyPr lIns="0" rIns="0" tIns="0" bIns="0"/>
+          <a:bodyPr lIns="0" tIns="0" rIns="0" bIns="0"/>
+          <a:lstStyle/>
           <a:p>
-            <a:endParaRPr b="0" lang="en-US" sz="8740" spc="-1" strike="noStrike">
+            <a:endParaRPr lang="en-US" sz="8740" b="0" strike="noStrike" spc="-1">
               <a:solidFill>
                 <a:srgbClr val="000000"/>
               </a:solidFill>
               <a:uFill>
                 <a:solidFill>
-                  <a:srgbClr val="ffffff"/>
+                  <a:srgbClr val="FFFFFF"/>
                 </a:solidFill>
               </a:uFill>
               <a:latin typeface="Calibri"/>
@@ -696,15 +835,16 @@
           </a:prstGeom>
         </p:spPr>
         <p:txBody>
-          <a:bodyPr lIns="0" rIns="0" tIns="0" bIns="0"/>
+          <a:bodyPr lIns="0" tIns="0" rIns="0" bIns="0"/>
+          <a:lstStyle/>
           <a:p>
-            <a:endParaRPr b="0" lang="en-US" sz="8740" spc="-1" strike="noStrike">
+            <a:endParaRPr lang="en-US" sz="8740" b="0" strike="noStrike" spc="-1">
               <a:solidFill>
                 <a:srgbClr val="000000"/>
               </a:solidFill>
               <a:uFill>
                 <a:solidFill>
-                  <a:srgbClr val="ffffff"/>
+                  <a:srgbClr val="FFFFFF"/>
                 </a:solidFill>
               </a:uFill>
               <a:latin typeface="Calibri"/>
@@ -732,15 +872,16 @@
           </a:prstGeom>
         </p:spPr>
         <p:txBody>
-          <a:bodyPr lIns="0" rIns="0" tIns="0" bIns="0"/>
+          <a:bodyPr lIns="0" tIns="0" rIns="0" bIns="0"/>
+          <a:lstStyle/>
           <a:p>
-            <a:endParaRPr b="0" lang="en-US" sz="8740" spc="-1" strike="noStrike">
+            <a:endParaRPr lang="en-US" sz="8740" b="0" strike="noStrike" spc="-1">
               <a:solidFill>
                 <a:srgbClr val="000000"/>
               </a:solidFill>
               <a:uFill>
                 <a:solidFill>
-                  <a:srgbClr val="ffffff"/>
+                  <a:srgbClr val="FFFFFF"/>
                 </a:solidFill>
               </a:uFill>
               <a:latin typeface="Calibri"/>
@@ -750,11 +891,14 @@
       </p:sp>
     </p:spTree>
   </p:cSld>
+  <p:clrMapOvr>
+    <a:masterClrMapping/>
+  </p:clrMapOvr>
 </p:sldLayout>
 </file>
 
 <file path=ppt/slideLayouts/slideLayout12.xml><?xml version="1.0" encoding="utf-8"?>
-<p:sldLayout xmlns:a="http://schemas.openxmlformats.org/drawingml/2006/main" xmlns:p="http://schemas.openxmlformats.org/presentationml/2006/main" xmlns:r="http://schemas.openxmlformats.org/officeDocument/2006/relationships" xmlns:p14="http://schemas.microsoft.com/office/powerpoint/2010/main" xmlns:p15="http://schemas.microsoft.com/office/powerpoint/2012/main" xmlns:mc="http://schemas.openxmlformats.org/markup-compatibility/2006" type="blank" preserve="1">
+<p:sldLayout xmlns:a="http://schemas.openxmlformats.org/drawingml/2006/main" xmlns:r="http://schemas.openxmlformats.org/officeDocument/2006/relationships" xmlns:p="http://schemas.openxmlformats.org/presentationml/2006/main" type="blank" preserve="1">
   <p:cSld name="Title, 6 Content">
     <p:spTree>
       <p:nvGrpSpPr>
@@ -790,15 +934,16 @@
           </a:prstGeom>
         </p:spPr>
         <p:txBody>
-          <a:bodyPr lIns="0" rIns="0" tIns="0" bIns="0" anchor="ctr"/>
+          <a:bodyPr lIns="0" tIns="0" rIns="0" bIns="0" anchor="ctr"/>
+          <a:lstStyle/>
           <a:p>
-            <a:endParaRPr b="0" lang="en-US" sz="4880" spc="-1" strike="noStrike">
+            <a:endParaRPr lang="en-US" sz="4880" b="0" strike="noStrike" spc="-1">
               <a:solidFill>
                 <a:srgbClr val="000000"/>
               </a:solidFill>
               <a:uFill>
                 <a:solidFill>
-                  <a:srgbClr val="ffffff"/>
+                  <a:srgbClr val="FFFFFF"/>
                 </a:solidFill>
               </a:uFill>
               <a:latin typeface="Calibri"/>
@@ -826,15 +971,16 @@
           </a:prstGeom>
         </p:spPr>
         <p:txBody>
-          <a:bodyPr lIns="0" rIns="0" tIns="0" bIns="0"/>
+          <a:bodyPr lIns="0" tIns="0" rIns="0" bIns="0"/>
+          <a:lstStyle/>
           <a:p>
-            <a:endParaRPr b="0" lang="en-US" sz="8740" spc="-1" strike="noStrike">
+            <a:endParaRPr lang="en-US" sz="8740" b="0" strike="noStrike" spc="-1">
               <a:solidFill>
                 <a:srgbClr val="000000"/>
               </a:solidFill>
               <a:uFill>
                 <a:solidFill>
-                  <a:srgbClr val="ffffff"/>
+                  <a:srgbClr val="FFFFFF"/>
                 </a:solidFill>
               </a:uFill>
               <a:latin typeface="Calibri"/>
@@ -862,15 +1008,16 @@
           </a:prstGeom>
         </p:spPr>
         <p:txBody>
-          <a:bodyPr lIns="0" rIns="0" tIns="0" bIns="0"/>
+          <a:bodyPr lIns="0" tIns="0" rIns="0" bIns="0"/>
+          <a:lstStyle/>
           <a:p>
-            <a:endParaRPr b="0" lang="en-US" sz="8740" spc="-1" strike="noStrike">
+            <a:endParaRPr lang="en-US" sz="8740" b="0" strike="noStrike" spc="-1">
               <a:solidFill>
                 <a:srgbClr val="000000"/>
               </a:solidFill>
               <a:uFill>
                 <a:solidFill>
-                  <a:srgbClr val="ffffff"/>
+                  <a:srgbClr val="FFFFFF"/>
                 </a:solidFill>
               </a:uFill>
               <a:latin typeface="Calibri"/>
@@ -880,7 +1027,7 @@
       </p:sp>
       <p:pic>
         <p:nvPicPr>
-          <p:cNvPr id="36" name="" descr=""/>
+          <p:cNvPr id="36" name="Picture 35"/>
           <p:cNvPicPr/>
           <p:nvPr/>
         </p:nvPicPr>
@@ -903,12 +1050,12 @@
       </p:pic>
       <p:pic>
         <p:nvPicPr>
-          <p:cNvPr id="37" name="" descr=""/>
+          <p:cNvPr id="37" name="Picture 36"/>
           <p:cNvPicPr/>
           <p:nvPr/>
         </p:nvPicPr>
         <p:blipFill>
-          <a:blip r:embed="rId3"/>
+          <a:blip r:embed="rId2"/>
           <a:stretch/>
         </p:blipFill>
         <p:spPr>
@@ -926,11 +1073,14 @@
       </p:pic>
     </p:spTree>
   </p:cSld>
+  <p:clrMapOvr>
+    <a:masterClrMapping/>
+  </p:clrMapOvr>
 </p:sldLayout>
 </file>
 
 <file path=ppt/slideLayouts/slideLayout2.xml><?xml version="1.0" encoding="utf-8"?>
-<p:sldLayout xmlns:a="http://schemas.openxmlformats.org/drawingml/2006/main" xmlns:p="http://schemas.openxmlformats.org/presentationml/2006/main" xmlns:r="http://schemas.openxmlformats.org/officeDocument/2006/relationships" xmlns:p14="http://schemas.microsoft.com/office/powerpoint/2010/main" xmlns:p15="http://schemas.microsoft.com/office/powerpoint/2012/main" xmlns:mc="http://schemas.openxmlformats.org/markup-compatibility/2006" type="tx" preserve="1">
+<p:sldLayout xmlns:a="http://schemas.openxmlformats.org/drawingml/2006/main" xmlns:r="http://schemas.openxmlformats.org/officeDocument/2006/relationships" xmlns:p="http://schemas.openxmlformats.org/presentationml/2006/main" type="tx" preserve="1">
   <p:cSld name="Title Slide">
     <p:spTree>
       <p:nvGrpSpPr>
@@ -966,15 +1116,16 @@
           </a:prstGeom>
         </p:spPr>
         <p:txBody>
-          <a:bodyPr lIns="0" rIns="0" tIns="0" bIns="0" anchor="ctr"/>
+          <a:bodyPr lIns="0" tIns="0" rIns="0" bIns="0" anchor="ctr"/>
+          <a:lstStyle/>
           <a:p>
-            <a:endParaRPr b="0" lang="en-US" sz="4880" spc="-1" strike="noStrike">
+            <a:endParaRPr lang="en-US" sz="4880" b="0" strike="noStrike" spc="-1">
               <a:solidFill>
                 <a:srgbClr val="000000"/>
               </a:solidFill>
               <a:uFill>
                 <a:solidFill>
-                  <a:srgbClr val="ffffff"/>
+                  <a:srgbClr val="FFFFFF"/>
                 </a:solidFill>
               </a:uFill>
               <a:latin typeface="Calibri"/>
@@ -1002,16 +1153,17 @@
           </a:prstGeom>
         </p:spPr>
         <p:txBody>
-          <a:bodyPr lIns="0" rIns="0" tIns="0" bIns="0" anchor="ctr"/>
+          <a:bodyPr lIns="0" tIns="0" rIns="0" bIns="0" anchor="ctr"/>
+          <a:lstStyle/>
           <a:p>
             <a:pPr algn="ctr"/>
-            <a:endParaRPr b="0" lang="ru-RU" sz="3200" spc="-1" strike="noStrike">
+            <a:endParaRPr lang="ru-RU" sz="3200" b="0" strike="noStrike" spc="-1">
               <a:solidFill>
                 <a:srgbClr val="000000"/>
               </a:solidFill>
               <a:uFill>
                 <a:solidFill>
-                  <a:srgbClr val="ffffff"/>
+                  <a:srgbClr val="FFFFFF"/>
                 </a:solidFill>
               </a:uFill>
               <a:latin typeface="Arial"/>
@@ -1021,11 +1173,14 @@
       </p:sp>
     </p:spTree>
   </p:cSld>
+  <p:clrMapOvr>
+    <a:masterClrMapping/>
+  </p:clrMapOvr>
 </p:sldLayout>
 </file>
 
 <file path=ppt/slideLayouts/slideLayout3.xml><?xml version="1.0" encoding="utf-8"?>
-<p:sldLayout xmlns:a="http://schemas.openxmlformats.org/drawingml/2006/main" xmlns:p="http://schemas.openxmlformats.org/presentationml/2006/main" xmlns:r="http://schemas.openxmlformats.org/officeDocument/2006/relationships" xmlns:p14="http://schemas.microsoft.com/office/powerpoint/2010/main" xmlns:p15="http://schemas.microsoft.com/office/powerpoint/2012/main" xmlns:mc="http://schemas.openxmlformats.org/markup-compatibility/2006" type="obj" preserve="1">
+<p:sldLayout xmlns:a="http://schemas.openxmlformats.org/drawingml/2006/main" xmlns:r="http://schemas.openxmlformats.org/officeDocument/2006/relationships" xmlns:p="http://schemas.openxmlformats.org/presentationml/2006/main" type="obj" preserve="1">
   <p:cSld name="Title, Content">
     <p:spTree>
       <p:nvGrpSpPr>
@@ -1061,15 +1216,16 @@
           </a:prstGeom>
         </p:spPr>
         <p:txBody>
-          <a:bodyPr lIns="0" rIns="0" tIns="0" bIns="0" anchor="ctr"/>
+          <a:bodyPr lIns="0" tIns="0" rIns="0" bIns="0" anchor="ctr"/>
+          <a:lstStyle/>
           <a:p>
-            <a:endParaRPr b="0" lang="en-US" sz="4880" spc="-1" strike="noStrike">
+            <a:endParaRPr lang="en-US" sz="4880" b="0" strike="noStrike" spc="-1">
               <a:solidFill>
                 <a:srgbClr val="000000"/>
               </a:solidFill>
               <a:uFill>
                 <a:solidFill>
-                  <a:srgbClr val="ffffff"/>
+                  <a:srgbClr val="FFFFFF"/>
                 </a:solidFill>
               </a:uFill>
               <a:latin typeface="Calibri"/>
@@ -1097,15 +1253,16 @@
           </a:prstGeom>
         </p:spPr>
         <p:txBody>
-          <a:bodyPr lIns="0" rIns="0" tIns="0" bIns="0"/>
+          <a:bodyPr lIns="0" tIns="0" rIns="0" bIns="0"/>
+          <a:lstStyle/>
           <a:p>
-            <a:endParaRPr b="0" lang="en-US" sz="8740" spc="-1" strike="noStrike">
+            <a:endParaRPr lang="en-US" sz="8740" b="0" strike="noStrike" spc="-1">
               <a:solidFill>
                 <a:srgbClr val="000000"/>
               </a:solidFill>
               <a:uFill>
                 <a:solidFill>
-                  <a:srgbClr val="ffffff"/>
+                  <a:srgbClr val="FFFFFF"/>
                 </a:solidFill>
               </a:uFill>
               <a:latin typeface="Calibri"/>
@@ -1115,11 +1272,14 @@
       </p:sp>
     </p:spTree>
   </p:cSld>
+  <p:clrMapOvr>
+    <a:masterClrMapping/>
+  </p:clrMapOvr>
 </p:sldLayout>
 </file>
 
 <file path=ppt/slideLayouts/slideLayout4.xml><?xml version="1.0" encoding="utf-8"?>
-<p:sldLayout xmlns:a="http://schemas.openxmlformats.org/drawingml/2006/main" xmlns:p="http://schemas.openxmlformats.org/presentationml/2006/main" xmlns:r="http://schemas.openxmlformats.org/officeDocument/2006/relationships" xmlns:p14="http://schemas.microsoft.com/office/powerpoint/2010/main" xmlns:p15="http://schemas.microsoft.com/office/powerpoint/2012/main" xmlns:mc="http://schemas.openxmlformats.org/markup-compatibility/2006" type="twoObj" preserve="1">
+<p:sldLayout xmlns:a="http://schemas.openxmlformats.org/drawingml/2006/main" xmlns:r="http://schemas.openxmlformats.org/officeDocument/2006/relationships" xmlns:p="http://schemas.openxmlformats.org/presentationml/2006/main" type="twoObj" preserve="1">
   <p:cSld name="Title, 2 Content">
     <p:spTree>
       <p:nvGrpSpPr>
@@ -1155,15 +1315,16 @@
           </a:prstGeom>
         </p:spPr>
         <p:txBody>
-          <a:bodyPr lIns="0" rIns="0" tIns="0" bIns="0" anchor="ctr"/>
+          <a:bodyPr lIns="0" tIns="0" rIns="0" bIns="0" anchor="ctr"/>
+          <a:lstStyle/>
           <a:p>
-            <a:endParaRPr b="0" lang="en-US" sz="4880" spc="-1" strike="noStrike">
+            <a:endParaRPr lang="en-US" sz="4880" b="0" strike="noStrike" spc="-1">
               <a:solidFill>
                 <a:srgbClr val="000000"/>
               </a:solidFill>
               <a:uFill>
                 <a:solidFill>
-                  <a:srgbClr val="ffffff"/>
+                  <a:srgbClr val="FFFFFF"/>
                 </a:solidFill>
               </a:uFill>
               <a:latin typeface="Calibri"/>
@@ -1191,15 +1352,16 @@
           </a:prstGeom>
         </p:spPr>
         <p:txBody>
-          <a:bodyPr lIns="0" rIns="0" tIns="0" bIns="0"/>
+          <a:bodyPr lIns="0" tIns="0" rIns="0" bIns="0"/>
+          <a:lstStyle/>
           <a:p>
-            <a:endParaRPr b="0" lang="en-US" sz="8740" spc="-1" strike="noStrike">
+            <a:endParaRPr lang="en-US" sz="8740" b="0" strike="noStrike" spc="-1">
               <a:solidFill>
                 <a:srgbClr val="000000"/>
               </a:solidFill>
               <a:uFill>
                 <a:solidFill>
-                  <a:srgbClr val="ffffff"/>
+                  <a:srgbClr val="FFFFFF"/>
                 </a:solidFill>
               </a:uFill>
               <a:latin typeface="Calibri"/>
@@ -1227,15 +1389,16 @@
           </a:prstGeom>
         </p:spPr>
         <p:txBody>
-          <a:bodyPr lIns="0" rIns="0" tIns="0" bIns="0"/>
+          <a:bodyPr lIns="0" tIns="0" rIns="0" bIns="0"/>
+          <a:lstStyle/>
           <a:p>
-            <a:endParaRPr b="0" lang="en-US" sz="8740" spc="-1" strike="noStrike">
+            <a:endParaRPr lang="en-US" sz="8740" b="0" strike="noStrike" spc="-1">
               <a:solidFill>
                 <a:srgbClr val="000000"/>
               </a:solidFill>
               <a:uFill>
                 <a:solidFill>
-                  <a:srgbClr val="ffffff"/>
+                  <a:srgbClr val="FFFFFF"/>
                 </a:solidFill>
               </a:uFill>
               <a:latin typeface="Calibri"/>
@@ -1245,11 +1408,14 @@
       </p:sp>
     </p:spTree>
   </p:cSld>
+  <p:clrMapOvr>
+    <a:masterClrMapping/>
+  </p:clrMapOvr>
 </p:sldLayout>
 </file>
 
 <file path=ppt/slideLayouts/slideLayout5.xml><?xml version="1.0" encoding="utf-8"?>
-<p:sldLayout xmlns:a="http://schemas.openxmlformats.org/drawingml/2006/main" xmlns:p="http://schemas.openxmlformats.org/presentationml/2006/main" xmlns:r="http://schemas.openxmlformats.org/officeDocument/2006/relationships" xmlns:p14="http://schemas.microsoft.com/office/powerpoint/2010/main" xmlns:p15="http://schemas.microsoft.com/office/powerpoint/2012/main" xmlns:mc="http://schemas.openxmlformats.org/markup-compatibility/2006" type="titleOnly" preserve="1">
+<p:sldLayout xmlns:a="http://schemas.openxmlformats.org/drawingml/2006/main" xmlns:r="http://schemas.openxmlformats.org/officeDocument/2006/relationships" xmlns:p="http://schemas.openxmlformats.org/presentationml/2006/main" type="titleOnly" preserve="1">
   <p:cSld name="Title Only">
     <p:spTree>
       <p:nvGrpSpPr>
@@ -1285,15 +1451,16 @@
           </a:prstGeom>
         </p:spPr>
         <p:txBody>
-          <a:bodyPr lIns="0" rIns="0" tIns="0" bIns="0" anchor="ctr"/>
+          <a:bodyPr lIns="0" tIns="0" rIns="0" bIns="0" anchor="ctr"/>
+          <a:lstStyle/>
           <a:p>
-            <a:endParaRPr b="0" lang="en-US" sz="4880" spc="-1" strike="noStrike">
+            <a:endParaRPr lang="en-US" sz="4880" b="0" strike="noStrike" spc="-1">
               <a:solidFill>
                 <a:srgbClr val="000000"/>
               </a:solidFill>
               <a:uFill>
                 <a:solidFill>
-                  <a:srgbClr val="ffffff"/>
+                  <a:srgbClr val="FFFFFF"/>
                 </a:solidFill>
               </a:uFill>
               <a:latin typeface="Calibri"/>
@@ -1303,11 +1470,14 @@
       </p:sp>
     </p:spTree>
   </p:cSld>
+  <p:clrMapOvr>
+    <a:masterClrMapping/>
+  </p:clrMapOvr>
 </p:sldLayout>
 </file>
 
 <file path=ppt/slideLayouts/slideLayout6.xml><?xml version="1.0" encoding="utf-8"?>
-<p:sldLayout xmlns:a="http://schemas.openxmlformats.org/drawingml/2006/main" xmlns:p="http://schemas.openxmlformats.org/presentationml/2006/main" xmlns:r="http://schemas.openxmlformats.org/officeDocument/2006/relationships" xmlns:p14="http://schemas.microsoft.com/office/powerpoint/2010/main" xmlns:p15="http://schemas.microsoft.com/office/powerpoint/2012/main" xmlns:mc="http://schemas.openxmlformats.org/markup-compatibility/2006" type="objOnly" preserve="1">
+<p:sldLayout xmlns:a="http://schemas.openxmlformats.org/drawingml/2006/main" xmlns:r="http://schemas.openxmlformats.org/officeDocument/2006/relationships" xmlns:p="http://schemas.openxmlformats.org/presentationml/2006/main" type="objOnly" preserve="1">
   <p:cSld name="Centered Text">
     <p:spTree>
       <p:nvGrpSpPr>
@@ -1343,16 +1513,17 @@
           </a:prstGeom>
         </p:spPr>
         <p:txBody>
-          <a:bodyPr lIns="0" rIns="0" tIns="0" bIns="0" anchor="ctr"/>
+          <a:bodyPr lIns="0" tIns="0" rIns="0" bIns="0" anchor="ctr"/>
+          <a:lstStyle/>
           <a:p>
             <a:pPr algn="ctr"/>
-            <a:endParaRPr b="0" lang="ru-RU" sz="3200" spc="-1" strike="noStrike">
+            <a:endParaRPr lang="ru-RU" sz="3200" b="0" strike="noStrike" spc="-1">
               <a:solidFill>
                 <a:srgbClr val="000000"/>
               </a:solidFill>
               <a:uFill>
                 <a:solidFill>
-                  <a:srgbClr val="ffffff"/>
+                  <a:srgbClr val="FFFFFF"/>
                 </a:solidFill>
               </a:uFill>
               <a:latin typeface="Arial"/>
@@ -1362,11 +1533,14 @@
       </p:sp>
     </p:spTree>
   </p:cSld>
+  <p:clrMapOvr>
+    <a:masterClrMapping/>
+  </p:clrMapOvr>
 </p:sldLayout>
 </file>
 
 <file path=ppt/slideLayouts/slideLayout7.xml><?xml version="1.0" encoding="utf-8"?>
-<p:sldLayout xmlns:a="http://schemas.openxmlformats.org/drawingml/2006/main" xmlns:p="http://schemas.openxmlformats.org/presentationml/2006/main" xmlns:r="http://schemas.openxmlformats.org/officeDocument/2006/relationships" xmlns:p14="http://schemas.microsoft.com/office/powerpoint/2010/main" xmlns:p15="http://schemas.microsoft.com/office/powerpoint/2012/main" xmlns:mc="http://schemas.openxmlformats.org/markup-compatibility/2006" type="twoObjAndObj" preserve="1">
+<p:sldLayout xmlns:a="http://schemas.openxmlformats.org/drawingml/2006/main" xmlns:r="http://schemas.openxmlformats.org/officeDocument/2006/relationships" xmlns:p="http://schemas.openxmlformats.org/presentationml/2006/main" type="twoObjAndObj" preserve="1">
   <p:cSld name="Title, 2 Content and Content">
     <p:spTree>
       <p:nvGrpSpPr>
@@ -1402,15 +1576,16 @@
           </a:prstGeom>
         </p:spPr>
         <p:txBody>
-          <a:bodyPr lIns="0" rIns="0" tIns="0" bIns="0" anchor="ctr"/>
+          <a:bodyPr lIns="0" tIns="0" rIns="0" bIns="0" anchor="ctr"/>
+          <a:lstStyle/>
           <a:p>
-            <a:endParaRPr b="0" lang="en-US" sz="4880" spc="-1" strike="noStrike">
+            <a:endParaRPr lang="en-US" sz="4880" b="0" strike="noStrike" spc="-1">
               <a:solidFill>
                 <a:srgbClr val="000000"/>
               </a:solidFill>
               <a:uFill>
                 <a:solidFill>
-                  <a:srgbClr val="ffffff"/>
+                  <a:srgbClr val="FFFFFF"/>
                 </a:solidFill>
               </a:uFill>
               <a:latin typeface="Calibri"/>
@@ -1438,15 +1613,16 @@
           </a:prstGeom>
         </p:spPr>
         <p:txBody>
-          <a:bodyPr lIns="0" rIns="0" tIns="0" bIns="0"/>
+          <a:bodyPr lIns="0" tIns="0" rIns="0" bIns="0"/>
+          <a:lstStyle/>
           <a:p>
-            <a:endParaRPr b="0" lang="en-US" sz="8740" spc="-1" strike="noStrike">
+            <a:endParaRPr lang="en-US" sz="8740" b="0" strike="noStrike" spc="-1">
               <a:solidFill>
                 <a:srgbClr val="000000"/>
               </a:solidFill>
               <a:uFill>
                 <a:solidFill>
-                  <a:srgbClr val="ffffff"/>
+                  <a:srgbClr val="FFFFFF"/>
                 </a:solidFill>
               </a:uFill>
               <a:latin typeface="Calibri"/>
@@ -1474,15 +1650,16 @@
           </a:prstGeom>
         </p:spPr>
         <p:txBody>
-          <a:bodyPr lIns="0" rIns="0" tIns="0" bIns="0"/>
+          <a:bodyPr lIns="0" tIns="0" rIns="0" bIns="0"/>
+          <a:lstStyle/>
           <a:p>
-            <a:endParaRPr b="0" lang="en-US" sz="8740" spc="-1" strike="noStrike">
+            <a:endParaRPr lang="en-US" sz="8740" b="0" strike="noStrike" spc="-1">
               <a:solidFill>
                 <a:srgbClr val="000000"/>
               </a:solidFill>
               <a:uFill>
                 <a:solidFill>
-                  <a:srgbClr val="ffffff"/>
+                  <a:srgbClr val="FFFFFF"/>
                 </a:solidFill>
               </a:uFill>
               <a:latin typeface="Calibri"/>
@@ -1510,15 +1687,16 @@
           </a:prstGeom>
         </p:spPr>
         <p:txBody>
-          <a:bodyPr lIns="0" rIns="0" tIns="0" bIns="0"/>
+          <a:bodyPr lIns="0" tIns="0" rIns="0" bIns="0"/>
+          <a:lstStyle/>
           <a:p>
-            <a:endParaRPr b="0" lang="en-US" sz="8740" spc="-1" strike="noStrike">
+            <a:endParaRPr lang="en-US" sz="8740" b="0" strike="noStrike" spc="-1">
               <a:solidFill>
                 <a:srgbClr val="000000"/>
               </a:solidFill>
               <a:uFill>
                 <a:solidFill>
-                  <a:srgbClr val="ffffff"/>
+                  <a:srgbClr val="FFFFFF"/>
                 </a:solidFill>
               </a:uFill>
               <a:latin typeface="Calibri"/>
@@ -1528,11 +1706,14 @@
       </p:sp>
     </p:spTree>
   </p:cSld>
+  <p:clrMapOvr>
+    <a:masterClrMapping/>
+  </p:clrMapOvr>
 </p:sldLayout>
 </file>
 
 <file path=ppt/slideLayouts/slideLayout8.xml><?xml version="1.0" encoding="utf-8"?>
-<p:sldLayout xmlns:a="http://schemas.openxmlformats.org/drawingml/2006/main" xmlns:p="http://schemas.openxmlformats.org/presentationml/2006/main" xmlns:r="http://schemas.openxmlformats.org/officeDocument/2006/relationships" xmlns:p14="http://schemas.microsoft.com/office/powerpoint/2010/main" xmlns:p15="http://schemas.microsoft.com/office/powerpoint/2012/main" xmlns:mc="http://schemas.openxmlformats.org/markup-compatibility/2006" type="objAndTwoObj" preserve="1">
+<p:sldLayout xmlns:a="http://schemas.openxmlformats.org/drawingml/2006/main" xmlns:r="http://schemas.openxmlformats.org/officeDocument/2006/relationships" xmlns:p="http://schemas.openxmlformats.org/presentationml/2006/main" type="objAndTwoObj" preserve="1">
   <p:cSld name="Title Content and 2 Content">
     <p:spTree>
       <p:nvGrpSpPr>
@@ -1568,15 +1749,16 @@
           </a:prstGeom>
         </p:spPr>
         <p:txBody>
-          <a:bodyPr lIns="0" rIns="0" tIns="0" bIns="0" anchor="ctr"/>
+          <a:bodyPr lIns="0" tIns="0" rIns="0" bIns="0" anchor="ctr"/>
+          <a:lstStyle/>
           <a:p>
-            <a:endParaRPr b="0" lang="en-US" sz="4880" spc="-1" strike="noStrike">
+            <a:endParaRPr lang="en-US" sz="4880" b="0" strike="noStrike" spc="-1">
               <a:solidFill>
                 <a:srgbClr val="000000"/>
               </a:solidFill>
               <a:uFill>
                 <a:solidFill>
-                  <a:srgbClr val="ffffff"/>
+                  <a:srgbClr val="FFFFFF"/>
                 </a:solidFill>
               </a:uFill>
               <a:latin typeface="Calibri"/>
@@ -1604,15 +1786,16 @@
           </a:prstGeom>
         </p:spPr>
         <p:txBody>
-          <a:bodyPr lIns="0" rIns="0" tIns="0" bIns="0"/>
+          <a:bodyPr lIns="0" tIns="0" rIns="0" bIns="0"/>
+          <a:lstStyle/>
           <a:p>
-            <a:endParaRPr b="0" lang="en-US" sz="8740" spc="-1" strike="noStrike">
+            <a:endParaRPr lang="en-US" sz="8740" b="0" strike="noStrike" spc="-1">
               <a:solidFill>
                 <a:srgbClr val="000000"/>
               </a:solidFill>
               <a:uFill>
                 <a:solidFill>
-                  <a:srgbClr val="ffffff"/>
+                  <a:srgbClr val="FFFFFF"/>
                 </a:solidFill>
               </a:uFill>
               <a:latin typeface="Calibri"/>
@@ -1640,15 +1823,16 @@
           </a:prstGeom>
         </p:spPr>
         <p:txBody>
-          <a:bodyPr lIns="0" rIns="0" tIns="0" bIns="0"/>
+          <a:bodyPr lIns="0" tIns="0" rIns="0" bIns="0"/>
+          <a:lstStyle/>
           <a:p>
-            <a:endParaRPr b="0" lang="en-US" sz="8740" spc="-1" strike="noStrike">
+            <a:endParaRPr lang="en-US" sz="8740" b="0" strike="noStrike" spc="-1">
               <a:solidFill>
                 <a:srgbClr val="000000"/>
               </a:solidFill>
               <a:uFill>
                 <a:solidFill>
-                  <a:srgbClr val="ffffff"/>
+                  <a:srgbClr val="FFFFFF"/>
                 </a:solidFill>
               </a:uFill>
               <a:latin typeface="Calibri"/>
@@ -1676,15 +1860,16 @@
           </a:prstGeom>
         </p:spPr>
         <p:txBody>
-          <a:bodyPr lIns="0" rIns="0" tIns="0" bIns="0"/>
+          <a:bodyPr lIns="0" tIns="0" rIns="0" bIns="0"/>
+          <a:lstStyle/>
           <a:p>
-            <a:endParaRPr b="0" lang="en-US" sz="8740" spc="-1" strike="noStrike">
+            <a:endParaRPr lang="en-US" sz="8740" b="0" strike="noStrike" spc="-1">
               <a:solidFill>
                 <a:srgbClr val="000000"/>
               </a:solidFill>
               <a:uFill>
                 <a:solidFill>
-                  <a:srgbClr val="ffffff"/>
+                  <a:srgbClr val="FFFFFF"/>
                 </a:solidFill>
               </a:uFill>
               <a:latin typeface="Calibri"/>
@@ -1694,11 +1879,14 @@
       </p:sp>
     </p:spTree>
   </p:cSld>
+  <p:clrMapOvr>
+    <a:masterClrMapping/>
+  </p:clrMapOvr>
 </p:sldLayout>
 </file>
 
 <file path=ppt/slideLayouts/slideLayout9.xml><?xml version="1.0" encoding="utf-8"?>
-<p:sldLayout xmlns:a="http://schemas.openxmlformats.org/drawingml/2006/main" xmlns:p="http://schemas.openxmlformats.org/presentationml/2006/main" xmlns:r="http://schemas.openxmlformats.org/officeDocument/2006/relationships" xmlns:p14="http://schemas.microsoft.com/office/powerpoint/2010/main" xmlns:p15="http://schemas.microsoft.com/office/powerpoint/2012/main" xmlns:mc="http://schemas.openxmlformats.org/markup-compatibility/2006" type="twoObjOverTx" preserve="1">
+<p:sldLayout xmlns:a="http://schemas.openxmlformats.org/drawingml/2006/main" xmlns:r="http://schemas.openxmlformats.org/officeDocument/2006/relationships" xmlns:p="http://schemas.openxmlformats.org/presentationml/2006/main" type="twoObjOverTx" preserve="1">
   <p:cSld name="Title, 2 Content over Content">
     <p:spTree>
       <p:nvGrpSpPr>
@@ -1734,15 +1922,16 @@
           </a:prstGeom>
         </p:spPr>
         <p:txBody>
-          <a:bodyPr lIns="0" rIns="0" tIns="0" bIns="0" anchor="ctr"/>
+          <a:bodyPr lIns="0" tIns="0" rIns="0" bIns="0" anchor="ctr"/>
+          <a:lstStyle/>
           <a:p>
-            <a:endParaRPr b="0" lang="en-US" sz="4880" spc="-1" strike="noStrike">
+            <a:endParaRPr lang="en-US" sz="4880" b="0" strike="noStrike" spc="-1">
               <a:solidFill>
                 <a:srgbClr val="000000"/>
               </a:solidFill>
               <a:uFill>
                 <a:solidFill>
-                  <a:srgbClr val="ffffff"/>
+                  <a:srgbClr val="FFFFFF"/>
                 </a:solidFill>
               </a:uFill>
               <a:latin typeface="Calibri"/>
@@ -1770,15 +1959,16 @@
           </a:prstGeom>
         </p:spPr>
         <p:txBody>
-          <a:bodyPr lIns="0" rIns="0" tIns="0" bIns="0"/>
+          <a:bodyPr lIns="0" tIns="0" rIns="0" bIns="0"/>
+          <a:lstStyle/>
           <a:p>
-            <a:endParaRPr b="0" lang="en-US" sz="8740" spc="-1" strike="noStrike">
+            <a:endParaRPr lang="en-US" sz="8740" b="0" strike="noStrike" spc="-1">
               <a:solidFill>
                 <a:srgbClr val="000000"/>
               </a:solidFill>
               <a:uFill>
                 <a:solidFill>
-                  <a:srgbClr val="ffffff"/>
+                  <a:srgbClr val="FFFFFF"/>
                 </a:solidFill>
               </a:uFill>
               <a:latin typeface="Calibri"/>
@@ -1806,15 +1996,16 @@
           </a:prstGeom>
         </p:spPr>
         <p:txBody>
-          <a:bodyPr lIns="0" rIns="0" tIns="0" bIns="0"/>
+          <a:bodyPr lIns="0" tIns="0" rIns="0" bIns="0"/>
+          <a:lstStyle/>
           <a:p>
-            <a:endParaRPr b="0" lang="en-US" sz="8740" spc="-1" strike="noStrike">
+            <a:endParaRPr lang="en-US" sz="8740" b="0" strike="noStrike" spc="-1">
               <a:solidFill>
                 <a:srgbClr val="000000"/>
               </a:solidFill>
               <a:uFill>
                 <a:solidFill>
-                  <a:srgbClr val="ffffff"/>
+                  <a:srgbClr val="FFFFFF"/>
                 </a:solidFill>
               </a:uFill>
               <a:latin typeface="Calibri"/>
@@ -1842,15 +2033,16 @@
           </a:prstGeom>
         </p:spPr>
         <p:txBody>
-          <a:bodyPr lIns="0" rIns="0" tIns="0" bIns="0"/>
+          <a:bodyPr lIns="0" tIns="0" rIns="0" bIns="0"/>
+          <a:lstStyle/>
           <a:p>
-            <a:endParaRPr b="0" lang="en-US" sz="8740" spc="-1" strike="noStrike">
+            <a:endParaRPr lang="en-US" sz="8740" b="0" strike="noStrike" spc="-1">
               <a:solidFill>
                 <a:srgbClr val="000000"/>
               </a:solidFill>
               <a:uFill>
                 <a:solidFill>
-                  <a:srgbClr val="ffffff"/>
+                  <a:srgbClr val="FFFFFF"/>
                 </a:solidFill>
               </a:uFill>
               <a:latin typeface="Calibri"/>
@@ -1860,17 +2052,21 @@
       </p:sp>
     </p:spTree>
   </p:cSld>
+  <p:clrMapOvr>
+    <a:masterClrMapping/>
+  </p:clrMapOvr>
 </p:sldLayout>
 </file>
 
 <file path=ppt/slideMasters/slideMaster1.xml><?xml version="1.0" encoding="utf-8"?>
-<p:sldMaster xmlns:a="http://schemas.openxmlformats.org/drawingml/2006/main" xmlns:p="http://schemas.openxmlformats.org/presentationml/2006/main" xmlns:r="http://schemas.openxmlformats.org/officeDocument/2006/relationships" xmlns:p14="http://schemas.microsoft.com/office/powerpoint/2010/main" xmlns:p15="http://schemas.microsoft.com/office/powerpoint/2012/main" xmlns:mc="http://schemas.openxmlformats.org/markup-compatibility/2006">
+<p:sldMaster xmlns:a="http://schemas.openxmlformats.org/drawingml/2006/main" xmlns:r="http://schemas.openxmlformats.org/officeDocument/2006/relationships" xmlns:p="http://schemas.openxmlformats.org/presentationml/2006/main">
   <p:cSld>
     <p:bg>
       <p:bgPr>
         <a:solidFill>
-          <a:srgbClr val="ffffff"/>
+          <a:srgbClr val="FFFFFF"/>
         </a:solidFill>
+        <a:effectLst/>
       </p:bgPr>
     </p:bg>
     <p:spTree>
@@ -1889,7 +2085,7 @@
       </p:grpSpPr>
       <p:sp>
         <p:nvSpPr>
-          <p:cNvPr id="0" name="PlaceHolder 1"/>
+          <p:cNvPr id="4" name="PlaceHolder 1"/>
           <p:cNvSpPr>
             <a:spLocks noGrp="1"/>
           </p:cNvSpPr>
@@ -1908,6 +2104,7 @@
         </p:spPr>
         <p:txBody>
           <a:bodyPr anchor="b"/>
+          <a:lstStyle/>
           <a:p>
             <a:pPr algn="ctr">
               <a:lnSpc>
@@ -1915,110 +2112,26 @@
               </a:lnSpc>
             </a:pPr>
             <a:r>
-              <a:rPr b="0" lang="en-US" sz="18720" spc="-1" strike="noStrike">
+              <a:rPr lang="en-US" sz="18720" b="0" strike="noStrike" spc="-1">
                 <a:solidFill>
                   <a:srgbClr val="000000"/>
                 </a:solidFill>
                 <a:uFill>
                   <a:solidFill>
-                    <a:srgbClr val="ffffff"/>
+                    <a:srgbClr val="FFFFFF"/>
                   </a:solidFill>
                 </a:uFill>
                 <a:latin typeface="Calibri Light"/>
               </a:rPr>
-              <a:t>Click </a:t>
+              <a:t>Click to edit Master title style</a:t>
             </a:r>
-            <a:r>
-              <a:rPr b="0" lang="en-US" sz="18720" spc="-1" strike="noStrike">
-                <a:solidFill>
-                  <a:srgbClr val="000000"/>
-                </a:solidFill>
-                <a:uFill>
-                  <a:solidFill>
-                    <a:srgbClr val="ffffff"/>
-                  </a:solidFill>
-                </a:uFill>
-                <a:latin typeface="Calibri Light"/>
-              </a:rPr>
-              <a:t>to </a:t>
-            </a:r>
-            <a:r>
-              <a:rPr b="0" lang="en-US" sz="18720" spc="-1" strike="noStrike">
-                <a:solidFill>
-                  <a:srgbClr val="000000"/>
-                </a:solidFill>
-                <a:uFill>
-                  <a:solidFill>
-                    <a:srgbClr val="ffffff"/>
-                  </a:solidFill>
-                </a:uFill>
-                <a:latin typeface="Calibri Light"/>
-              </a:rPr>
-              <a:t>edit </a:t>
-            </a:r>
-            <a:r>
-              <a:rPr b="0" lang="en-US" sz="18720" spc="-1" strike="noStrike">
-                <a:solidFill>
-                  <a:srgbClr val="000000"/>
-                </a:solidFill>
-                <a:uFill>
-                  <a:solidFill>
-                    <a:srgbClr val="ffffff"/>
-                  </a:solidFill>
-                </a:uFill>
-                <a:latin typeface="Calibri Light"/>
-              </a:rPr>
-              <a:t>Mast</a:t>
-            </a:r>
-            <a:r>
-              <a:rPr b="0" lang="en-US" sz="18720" spc="-1" strike="noStrike">
-                <a:solidFill>
-                  <a:srgbClr val="000000"/>
-                </a:solidFill>
-                <a:uFill>
-                  <a:solidFill>
-                    <a:srgbClr val="ffffff"/>
-                  </a:solidFill>
-                </a:uFill>
-                <a:latin typeface="Calibri Light"/>
-              </a:rPr>
-              <a:t>er </a:t>
-            </a:r>
-            <a:r>
-              <a:rPr b="0" lang="en-US" sz="18720" spc="-1" strike="noStrike">
-                <a:solidFill>
-                  <a:srgbClr val="000000"/>
-                </a:solidFill>
-                <a:uFill>
-                  <a:solidFill>
-                    <a:srgbClr val="ffffff"/>
-                  </a:solidFill>
-                </a:uFill>
-                <a:latin typeface="Calibri Light"/>
-              </a:rPr>
-              <a:t>title </a:t>
-            </a:r>
-            <a:r>
-              <a:rPr b="0" lang="en-US" sz="18720" spc="-1" strike="noStrike">
-                <a:solidFill>
-                  <a:srgbClr val="000000"/>
-                </a:solidFill>
-                <a:uFill>
-                  <a:solidFill>
-                    <a:srgbClr val="ffffff"/>
-                  </a:solidFill>
-                </a:uFill>
-                <a:latin typeface="Calibri Light"/>
-              </a:rPr>
-              <a:t>style</a:t>
-            </a:r>
-            <a:endParaRPr b="0" lang="en-US" sz="18720" spc="-1" strike="noStrike">
+            <a:endParaRPr lang="en-US" sz="18720" b="0" strike="noStrike" spc="-1">
               <a:solidFill>
                 <a:srgbClr val="000000"/>
               </a:solidFill>
               <a:uFill>
                 <a:solidFill>
-                  <a:srgbClr val="ffffff"/>
+                  <a:srgbClr val="FFFFFF"/>
                 </a:solidFill>
               </a:uFill>
               <a:latin typeface="Calibri"/>
@@ -2028,7 +2141,7 @@
       </p:sp>
       <p:sp>
         <p:nvSpPr>
-          <p:cNvPr id="1" name="PlaceHolder 2"/>
+          <p:cNvPr id="5" name="PlaceHolder 2"/>
           <p:cNvSpPr>
             <a:spLocks noGrp="1"/>
           </p:cNvSpPr>
@@ -2047,6 +2160,7 @@
         </p:spPr>
         <p:txBody>
           <a:bodyPr anchor="ctr"/>
+          <a:lstStyle/>
           <a:p>
             <a:pPr>
               <a:lnSpc>
@@ -2054,26 +2168,26 @@
               </a:lnSpc>
             </a:pPr>
             <a:fld id="{F1B47378-A5AD-43CF-8BC2-0E84225B27E5}" type="datetime">
-              <a:rPr b="0" lang="ru-RU" sz="3750" spc="-1" strike="noStrike">
+              <a:rPr lang="ru-RU" sz="3750" b="0" strike="noStrike" spc="-1">
                 <a:solidFill>
-                  <a:srgbClr val="8b8b8b"/>
+                  <a:srgbClr val="8B8B8B"/>
                 </a:solidFill>
                 <a:uFill>
                   <a:solidFill>
-                    <a:srgbClr val="ffffff"/>
+                    <a:srgbClr val="FFFFFF"/>
                   </a:solidFill>
                 </a:uFill>
                 <a:latin typeface="Calibri"/>
               </a:rPr>
-              <a:t>21.5.17</a:t>
+              <a:t>22.05.17</a:t>
             </a:fld>
-            <a:endParaRPr b="0" lang="ru-RU" sz="1400" spc="-1" strike="noStrike">
+            <a:endParaRPr lang="ru-RU" sz="1400" b="0" strike="noStrike" spc="-1">
               <a:solidFill>
                 <a:srgbClr val="000000"/>
               </a:solidFill>
               <a:uFill>
                 <a:solidFill>
-                  <a:srgbClr val="ffffff"/>
+                  <a:srgbClr val="FFFFFF"/>
                 </a:solidFill>
               </a:uFill>
               <a:latin typeface="Times New Roman"/>
@@ -2102,14 +2216,15 @@
         </p:spPr>
         <p:txBody>
           <a:bodyPr anchor="ctr"/>
+          <a:lstStyle/>
           <a:p>
-            <a:endParaRPr b="0" lang="ru-RU" sz="2400" spc="-1" strike="noStrike">
+            <a:endParaRPr lang="ru-RU" sz="2400" b="0" strike="noStrike" spc="-1">
               <a:solidFill>
                 <a:srgbClr val="000000"/>
               </a:solidFill>
               <a:uFill>
                 <a:solidFill>
-                  <a:srgbClr val="ffffff"/>
+                  <a:srgbClr val="FFFFFF"/>
                 </a:solidFill>
               </a:uFill>
               <a:latin typeface="Times New Roman"/>
@@ -2138,6 +2253,7 @@
         </p:spPr>
         <p:txBody>
           <a:bodyPr anchor="ctr"/>
+          <a:lstStyle/>
           <a:p>
             <a:pPr algn="r">
               <a:lnSpc>
@@ -2145,26 +2261,26 @@
               </a:lnSpc>
             </a:pPr>
             <a:fld id="{B2DFE105-5276-494A-9853-3C3C35979C9C}" type="slidenum">
-              <a:rPr b="0" lang="ru-RU" sz="3750" spc="-1" strike="noStrike">
+              <a:rPr lang="ru-RU" sz="3750" b="0" strike="noStrike" spc="-1">
                 <a:solidFill>
-                  <a:srgbClr val="8b8b8b"/>
+                  <a:srgbClr val="8B8B8B"/>
                 </a:solidFill>
                 <a:uFill>
                   <a:solidFill>
-                    <a:srgbClr val="ffffff"/>
+                    <a:srgbClr val="FFFFFF"/>
                   </a:solidFill>
                 </a:uFill>
                 <a:latin typeface="Calibri"/>
               </a:rPr>
-              <a:t>&lt;номер&gt;</a:t>
+              <a:t>‹#›</a:t>
             </a:fld>
-            <a:endParaRPr b="0" lang="ru-RU" sz="1400" spc="-1" strike="noStrike">
+            <a:endParaRPr lang="ru-RU" sz="1400" b="0" strike="noStrike" spc="-1">
               <a:solidFill>
                 <a:srgbClr val="000000"/>
               </a:solidFill>
               <a:uFill>
                 <a:solidFill>
-                  <a:srgbClr val="ffffff"/>
+                  <a:srgbClr val="FFFFFF"/>
                 </a:solidFill>
               </a:uFill>
               <a:latin typeface="Times New Roman"/>
@@ -2174,26 +2290,306 @@
       </p:sp>
     </p:spTree>
   </p:cSld>
-  <p:clrMap bg1="lt1" bg2="lt2" tx1="dk1" tx2="dk2" accent1="accent1" accent2="accent2" accent3="accent3" accent4="accent4" accent5="accent5" accent6="accent6" hlink="hlink" folHlink="folHlink"/>
+  <p:clrMap bg1="lt1" tx1="dk1" bg2="lt2" tx2="dk2" accent1="accent1" accent2="accent2" accent3="accent3" accent4="accent4" accent5="accent5" accent6="accent6" hlink="hlink" folHlink="folHlink"/>
   <p:sldLayoutIdLst>
-    <p:sldLayoutId id="2147483649" r:id="rId2"/>
-    <p:sldLayoutId id="2147483650" r:id="rId3"/>
-    <p:sldLayoutId id="2147483651" r:id="rId4"/>
-    <p:sldLayoutId id="2147483652" r:id="rId5"/>
-    <p:sldLayoutId id="2147483653" r:id="rId6"/>
-    <p:sldLayoutId id="2147483654" r:id="rId7"/>
-    <p:sldLayoutId id="2147483655" r:id="rId8"/>
-    <p:sldLayoutId id="2147483656" r:id="rId9"/>
-    <p:sldLayoutId id="2147483657" r:id="rId10"/>
-    <p:sldLayoutId id="2147483658" r:id="rId11"/>
-    <p:sldLayoutId id="2147483659" r:id="rId12"/>
-    <p:sldLayoutId id="2147483660" r:id="rId13"/>
+    <p:sldLayoutId id="2147483649" r:id="rId1"/>
+    <p:sldLayoutId id="2147483650" r:id="rId2"/>
+    <p:sldLayoutId id="2147483651" r:id="rId3"/>
+    <p:sldLayoutId id="2147483652" r:id="rId4"/>
+    <p:sldLayoutId id="2147483653" r:id="rId5"/>
+    <p:sldLayoutId id="2147483654" r:id="rId6"/>
+    <p:sldLayoutId id="2147483655" r:id="rId7"/>
+    <p:sldLayoutId id="2147483656" r:id="rId8"/>
+    <p:sldLayoutId id="2147483657" r:id="rId9"/>
+    <p:sldLayoutId id="2147483658" r:id="rId10"/>
+    <p:sldLayoutId id="2147483659" r:id="rId11"/>
+    <p:sldLayoutId id="2147483660" r:id="rId12"/>
   </p:sldLayoutIdLst>
+  <p:txStyles>
+    <p:titleStyle>
+      <a:lvl1pPr algn="l" defTabSz="914400" rtl="0" eaLnBrk="1" latinLnBrk="0" hangingPunct="1">
+        <a:lnSpc>
+          <a:spcPct val="90000"/>
+        </a:lnSpc>
+        <a:spcBef>
+          <a:spcPct val="0"/>
+        </a:spcBef>
+        <a:buNone/>
+        <a:defRPr sz="4400" kern="1200">
+          <a:solidFill>
+            <a:schemeClr val="tx1"/>
+          </a:solidFill>
+          <a:latin typeface="+mj-lt"/>
+          <a:ea typeface="+mj-ea"/>
+          <a:cs typeface="+mj-cs"/>
+        </a:defRPr>
+      </a:lvl1pPr>
+    </p:titleStyle>
+    <p:bodyStyle>
+      <a:lvl1pPr marL="228600" indent="-228600" algn="l" defTabSz="914400" rtl="0" eaLnBrk="1" latinLnBrk="0" hangingPunct="1">
+        <a:lnSpc>
+          <a:spcPct val="90000"/>
+        </a:lnSpc>
+        <a:spcBef>
+          <a:spcPts val="1000"/>
+        </a:spcBef>
+        <a:buFont typeface="Arial"/>
+        <a:buChar char="•"/>
+        <a:defRPr sz="2800" kern="1200">
+          <a:solidFill>
+            <a:schemeClr val="tx1"/>
+          </a:solidFill>
+          <a:latin typeface="+mn-lt"/>
+          <a:ea typeface="+mn-ea"/>
+          <a:cs typeface="+mn-cs"/>
+        </a:defRPr>
+      </a:lvl1pPr>
+      <a:lvl2pPr marL="685800" indent="-228600" algn="l" defTabSz="914400" rtl="0" eaLnBrk="1" latinLnBrk="0" hangingPunct="1">
+        <a:lnSpc>
+          <a:spcPct val="90000"/>
+        </a:lnSpc>
+        <a:spcBef>
+          <a:spcPts val="500"/>
+        </a:spcBef>
+        <a:buFont typeface="Arial"/>
+        <a:buChar char="•"/>
+        <a:defRPr sz="2400" kern="1200">
+          <a:solidFill>
+            <a:schemeClr val="tx1"/>
+          </a:solidFill>
+          <a:latin typeface="+mn-lt"/>
+          <a:ea typeface="+mn-ea"/>
+          <a:cs typeface="+mn-cs"/>
+        </a:defRPr>
+      </a:lvl2pPr>
+      <a:lvl3pPr marL="1143000" indent="-228600" algn="l" defTabSz="914400" rtl="0" eaLnBrk="1" latinLnBrk="0" hangingPunct="1">
+        <a:lnSpc>
+          <a:spcPct val="90000"/>
+        </a:lnSpc>
+        <a:spcBef>
+          <a:spcPts val="500"/>
+        </a:spcBef>
+        <a:buFont typeface="Arial"/>
+        <a:buChar char="•"/>
+        <a:defRPr sz="2000" kern="1200">
+          <a:solidFill>
+            <a:schemeClr val="tx1"/>
+          </a:solidFill>
+          <a:latin typeface="+mn-lt"/>
+          <a:ea typeface="+mn-ea"/>
+          <a:cs typeface="+mn-cs"/>
+        </a:defRPr>
+      </a:lvl3pPr>
+      <a:lvl4pPr marL="1600200" indent="-228600" algn="l" defTabSz="914400" rtl="0" eaLnBrk="1" latinLnBrk="0" hangingPunct="1">
+        <a:lnSpc>
+          <a:spcPct val="90000"/>
+        </a:lnSpc>
+        <a:spcBef>
+          <a:spcPts val="500"/>
+        </a:spcBef>
+        <a:buFont typeface="Arial"/>
+        <a:buChar char="•"/>
+        <a:defRPr sz="1800" kern="1200">
+          <a:solidFill>
+            <a:schemeClr val="tx1"/>
+          </a:solidFill>
+          <a:latin typeface="+mn-lt"/>
+          <a:ea typeface="+mn-ea"/>
+          <a:cs typeface="+mn-cs"/>
+        </a:defRPr>
+      </a:lvl4pPr>
+      <a:lvl5pPr marL="2057400" indent="-228600" algn="l" defTabSz="914400" rtl="0" eaLnBrk="1" latinLnBrk="0" hangingPunct="1">
+        <a:lnSpc>
+          <a:spcPct val="90000"/>
+        </a:lnSpc>
+        <a:spcBef>
+          <a:spcPts val="500"/>
+        </a:spcBef>
+        <a:buFont typeface="Arial"/>
+        <a:buChar char="•"/>
+        <a:defRPr sz="1800" kern="1200">
+          <a:solidFill>
+            <a:schemeClr val="tx1"/>
+          </a:solidFill>
+          <a:latin typeface="+mn-lt"/>
+          <a:ea typeface="+mn-ea"/>
+          <a:cs typeface="+mn-cs"/>
+        </a:defRPr>
+      </a:lvl5pPr>
+      <a:lvl6pPr marL="2514600" indent="-228600" algn="l" defTabSz="914400" rtl="0" eaLnBrk="1" latinLnBrk="0" hangingPunct="1">
+        <a:lnSpc>
+          <a:spcPct val="90000"/>
+        </a:lnSpc>
+        <a:spcBef>
+          <a:spcPts val="500"/>
+        </a:spcBef>
+        <a:buFont typeface="Arial"/>
+        <a:buChar char="•"/>
+        <a:defRPr sz="1800" kern="1200">
+          <a:solidFill>
+            <a:schemeClr val="tx1"/>
+          </a:solidFill>
+          <a:latin typeface="+mn-lt"/>
+          <a:ea typeface="+mn-ea"/>
+          <a:cs typeface="+mn-cs"/>
+        </a:defRPr>
+      </a:lvl6pPr>
+      <a:lvl7pPr marL="2971800" indent="-228600" algn="l" defTabSz="914400" rtl="0" eaLnBrk="1" latinLnBrk="0" hangingPunct="1">
+        <a:lnSpc>
+          <a:spcPct val="90000"/>
+        </a:lnSpc>
+        <a:spcBef>
+          <a:spcPts val="500"/>
+        </a:spcBef>
+        <a:buFont typeface="Arial"/>
+        <a:buChar char="•"/>
+        <a:defRPr sz="1800" kern="1200">
+          <a:solidFill>
+            <a:schemeClr val="tx1"/>
+          </a:solidFill>
+          <a:latin typeface="+mn-lt"/>
+          <a:ea typeface="+mn-ea"/>
+          <a:cs typeface="+mn-cs"/>
+        </a:defRPr>
+      </a:lvl7pPr>
+      <a:lvl8pPr marL="3429000" indent="-228600" algn="l" defTabSz="914400" rtl="0" eaLnBrk="1" latinLnBrk="0" hangingPunct="1">
+        <a:lnSpc>
+          <a:spcPct val="90000"/>
+        </a:lnSpc>
+        <a:spcBef>
+          <a:spcPts val="500"/>
+        </a:spcBef>
+        <a:buFont typeface="Arial"/>
+        <a:buChar char="•"/>
+        <a:defRPr sz="1800" kern="1200">
+          <a:solidFill>
+            <a:schemeClr val="tx1"/>
+          </a:solidFill>
+          <a:latin typeface="+mn-lt"/>
+          <a:ea typeface="+mn-ea"/>
+          <a:cs typeface="+mn-cs"/>
+        </a:defRPr>
+      </a:lvl8pPr>
+      <a:lvl9pPr marL="3886200" indent="-228600" algn="l" defTabSz="914400" rtl="0" eaLnBrk="1" latinLnBrk="0" hangingPunct="1">
+        <a:lnSpc>
+          <a:spcPct val="90000"/>
+        </a:lnSpc>
+        <a:spcBef>
+          <a:spcPts val="500"/>
+        </a:spcBef>
+        <a:buFont typeface="Arial"/>
+        <a:buChar char="•"/>
+        <a:defRPr sz="1800" kern="1200">
+          <a:solidFill>
+            <a:schemeClr val="tx1"/>
+          </a:solidFill>
+          <a:latin typeface="+mn-lt"/>
+          <a:ea typeface="+mn-ea"/>
+          <a:cs typeface="+mn-cs"/>
+        </a:defRPr>
+      </a:lvl9pPr>
+    </p:bodyStyle>
+    <p:otherStyle>
+      <a:defPPr>
+        <a:defRPr lang="en-US"/>
+      </a:defPPr>
+      <a:lvl1pPr marL="0" algn="l" defTabSz="914400" rtl="0" eaLnBrk="1" latinLnBrk="0" hangingPunct="1">
+        <a:defRPr sz="1800" kern="1200">
+          <a:solidFill>
+            <a:schemeClr val="tx1"/>
+          </a:solidFill>
+          <a:latin typeface="+mn-lt"/>
+          <a:ea typeface="+mn-ea"/>
+          <a:cs typeface="+mn-cs"/>
+        </a:defRPr>
+      </a:lvl1pPr>
+      <a:lvl2pPr marL="457200" algn="l" defTabSz="914400" rtl="0" eaLnBrk="1" latinLnBrk="0" hangingPunct="1">
+        <a:defRPr sz="1800" kern="1200">
+          <a:solidFill>
+            <a:schemeClr val="tx1"/>
+          </a:solidFill>
+          <a:latin typeface="+mn-lt"/>
+          <a:ea typeface="+mn-ea"/>
+          <a:cs typeface="+mn-cs"/>
+        </a:defRPr>
+      </a:lvl2pPr>
+      <a:lvl3pPr marL="914400" algn="l" defTabSz="914400" rtl="0" eaLnBrk="1" latinLnBrk="0" hangingPunct="1">
+        <a:defRPr sz="1800" kern="1200">
+          <a:solidFill>
+            <a:schemeClr val="tx1"/>
+          </a:solidFill>
+          <a:latin typeface="+mn-lt"/>
+          <a:ea typeface="+mn-ea"/>
+          <a:cs typeface="+mn-cs"/>
+        </a:defRPr>
+      </a:lvl3pPr>
+      <a:lvl4pPr marL="1371600" algn="l" defTabSz="914400" rtl="0" eaLnBrk="1" latinLnBrk="0" hangingPunct="1">
+        <a:defRPr sz="1800" kern="1200">
+          <a:solidFill>
+            <a:schemeClr val="tx1"/>
+          </a:solidFill>
+          <a:latin typeface="+mn-lt"/>
+          <a:ea typeface="+mn-ea"/>
+          <a:cs typeface="+mn-cs"/>
+        </a:defRPr>
+      </a:lvl4pPr>
+      <a:lvl5pPr marL="1828800" algn="l" defTabSz="914400" rtl="0" eaLnBrk="1" latinLnBrk="0" hangingPunct="1">
+        <a:defRPr sz="1800" kern="1200">
+          <a:solidFill>
+            <a:schemeClr val="tx1"/>
+          </a:solidFill>
+          <a:latin typeface="+mn-lt"/>
+          <a:ea typeface="+mn-ea"/>
+          <a:cs typeface="+mn-cs"/>
+        </a:defRPr>
+      </a:lvl5pPr>
+      <a:lvl6pPr marL="2286000" algn="l" defTabSz="914400" rtl="0" eaLnBrk="1" latinLnBrk="0" hangingPunct="1">
+        <a:defRPr sz="1800" kern="1200">
+          <a:solidFill>
+            <a:schemeClr val="tx1"/>
+          </a:solidFill>
+          <a:latin typeface="+mn-lt"/>
+          <a:ea typeface="+mn-ea"/>
+          <a:cs typeface="+mn-cs"/>
+        </a:defRPr>
+      </a:lvl6pPr>
+      <a:lvl7pPr marL="2743200" algn="l" defTabSz="914400" rtl="0" eaLnBrk="1" latinLnBrk="0" hangingPunct="1">
+        <a:defRPr sz="1800" kern="1200">
+          <a:solidFill>
+            <a:schemeClr val="tx1"/>
+          </a:solidFill>
+          <a:latin typeface="+mn-lt"/>
+          <a:ea typeface="+mn-ea"/>
+          <a:cs typeface="+mn-cs"/>
+        </a:defRPr>
+      </a:lvl7pPr>
+      <a:lvl8pPr marL="3200400" algn="l" defTabSz="914400" rtl="0" eaLnBrk="1" latinLnBrk="0" hangingPunct="1">
+        <a:defRPr sz="1800" kern="1200">
+          <a:solidFill>
+            <a:schemeClr val="tx1"/>
+          </a:solidFill>
+          <a:latin typeface="+mn-lt"/>
+          <a:ea typeface="+mn-ea"/>
+          <a:cs typeface="+mn-cs"/>
+        </a:defRPr>
+      </a:lvl8pPr>
+      <a:lvl9pPr marL="3657600" algn="l" defTabSz="914400" rtl="0" eaLnBrk="1" latinLnBrk="0" hangingPunct="1">
+        <a:defRPr sz="1800" kern="1200">
+          <a:solidFill>
+            <a:schemeClr val="tx1"/>
+          </a:solidFill>
+          <a:latin typeface="+mn-lt"/>
+          <a:ea typeface="+mn-ea"/>
+          <a:cs typeface="+mn-cs"/>
+        </a:defRPr>
+      </a:lvl9pPr>
+    </p:otherStyle>
+  </p:txStyles>
 </p:sldMaster>
 </file>
 
 <file path=ppt/slides/slide1.xml><?xml version="1.0" encoding="utf-8"?>
-<p:sld xmlns:a="http://schemas.openxmlformats.org/drawingml/2006/main" xmlns:p="http://schemas.openxmlformats.org/presentationml/2006/main" xmlns:r="http://schemas.openxmlformats.org/officeDocument/2006/relationships" xmlns:p14="http://schemas.microsoft.com/office/powerpoint/2010/main" xmlns:p15="http://schemas.microsoft.com/office/powerpoint/2012/main" xmlns:mc="http://schemas.openxmlformats.org/markup-compatibility/2006">
+<p:sld xmlns:a="http://schemas.openxmlformats.org/drawingml/2006/main" xmlns:r="http://schemas.openxmlformats.org/officeDocument/2006/relationships" xmlns:p="http://schemas.openxmlformats.org/presentationml/2006/main">
   <p:cSld>
     <p:spTree>
       <p:nvGrpSpPr>
@@ -2217,7 +2613,7 @@
         </p:nvGraphicFramePr>
         <p:xfrm>
           <a:off x="1953360" y="1906920"/>
-          <a:ext cx="26105040" cy="5357880"/>
+          <a:ext cx="26105040" cy="6035040"/>
         </p:xfrm>
         <a:graphic>
           <a:graphicData uri="http://schemas.openxmlformats.org/drawingml/2006/table">
@@ -2231,7 +2627,8 @@
               <a:tr h="487080">
                 <a:tc>
                   <a:txBody>
-                    <a:bodyPr lIns="169920" rIns="169920" tIns="0" bIns="0"/>
+                    <a:bodyPr/>
+                    <a:lstStyle/>
                     <a:p>
                       <a:pPr>
                         <a:lnSpc>
@@ -2239,13 +2636,13 @@
                         </a:lnSpc>
                       </a:pPr>
                       <a:r>
-                        <a:rPr b="0" lang="ru-RU" sz="3000" spc="-1" strike="noStrike">
+                        <a:rPr lang="ru-RU" sz="3000" b="0" strike="noStrike" spc="-1">
                           <a:solidFill>
                             <a:srgbClr val="000000"/>
                           </a:solidFill>
                           <a:uFill>
                             <a:solidFill>
-                              <a:srgbClr val="ffffff"/>
+                              <a:srgbClr val="FFFFFF"/>
                             </a:solidFill>
                           </a:uFill>
                           <a:latin typeface="Calibri"/>
@@ -2253,13 +2650,13 @@
                         </a:rPr>
                         <a:t>Тип признака</a:t>
                       </a:r>
-                      <a:endParaRPr b="0" lang="ru-RU" sz="1800" spc="-1" strike="noStrike">
+                      <a:endParaRPr lang="ru-RU" sz="1800" b="0" strike="noStrike" spc="-1">
                         <a:solidFill>
                           <a:srgbClr val="000000"/>
                         </a:solidFill>
                         <a:uFill>
                           <a:solidFill>
-                            <a:srgbClr val="ffffff"/>
+                            <a:srgbClr val="FFFFFF"/>
                           </a:solidFill>
                         </a:uFill>
                         <a:latin typeface="Arial"/>
@@ -2292,7 +2689,8 @@
                 </a:tc>
                 <a:tc>
                   <a:txBody>
-                    <a:bodyPr lIns="169920" rIns="169920" tIns="0" bIns="0"/>
+                    <a:bodyPr/>
+                    <a:lstStyle/>
                     <a:p>
                       <a:pPr>
                         <a:lnSpc>
@@ -2300,13 +2698,13 @@
                         </a:lnSpc>
                       </a:pPr>
                       <a:r>
-                        <a:rPr b="0" lang="ru-RU" sz="3000" spc="-1" strike="noStrike">
+                        <a:rPr lang="ru-RU" sz="3000" b="0" strike="noStrike" spc="-1">
                           <a:solidFill>
                             <a:srgbClr val="000000"/>
                           </a:solidFill>
                           <a:uFill>
                             <a:solidFill>
-                              <a:srgbClr val="ffffff"/>
+                              <a:srgbClr val="FFFFFF"/>
                             </a:solidFill>
                           </a:uFill>
                           <a:latin typeface="Calibri"/>
@@ -2314,13 +2712,13 @@
                         </a:rPr>
                         <a:t>Название признака</a:t>
                       </a:r>
-                      <a:endParaRPr b="0" lang="ru-RU" sz="1800" spc="-1" strike="noStrike">
+                      <a:endParaRPr lang="ru-RU" sz="1800" b="0" strike="noStrike" spc="-1">
                         <a:solidFill>
                           <a:srgbClr val="000000"/>
                         </a:solidFill>
                         <a:uFill>
                           <a:solidFill>
-                            <a:srgbClr val="ffffff"/>
+                            <a:srgbClr val="FFFFFF"/>
                           </a:solidFill>
                         </a:uFill>
                         <a:latin typeface="Arial"/>
@@ -2353,7 +2751,8 @@
                 </a:tc>
                 <a:tc>
                   <a:txBody>
-                    <a:bodyPr lIns="169920" rIns="169920" tIns="0" bIns="0"/>
+                    <a:bodyPr/>
+                    <a:lstStyle/>
                     <a:p>
                       <a:pPr>
                         <a:lnSpc>
@@ -2361,13 +2760,13 @@
                         </a:lnSpc>
                       </a:pPr>
                       <a:r>
-                        <a:rPr b="0" lang="ru-RU" sz="3000" spc="-1" strike="noStrike">
+                        <a:rPr lang="ru-RU" sz="3000" b="0" strike="noStrike" spc="-1">
                           <a:solidFill>
                             <a:srgbClr val="000000"/>
                           </a:solidFill>
                           <a:uFill>
                             <a:solidFill>
-                              <a:srgbClr val="ffffff"/>
+                              <a:srgbClr val="FFFFFF"/>
                             </a:solidFill>
                           </a:uFill>
                           <a:latin typeface="Calibri"/>
@@ -2375,13 +2774,13 @@
                         </a:rPr>
                         <a:t>Отклонение от обучающей выборки</a:t>
                       </a:r>
-                      <a:endParaRPr b="0" lang="ru-RU" sz="1800" spc="-1" strike="noStrike">
+                      <a:endParaRPr lang="ru-RU" sz="1800" b="0" strike="noStrike" spc="-1">
                         <a:solidFill>
                           <a:srgbClr val="000000"/>
                         </a:solidFill>
                         <a:uFill>
                           <a:solidFill>
-                            <a:srgbClr val="ffffff"/>
+                            <a:srgbClr val="FFFFFF"/>
                           </a:solidFill>
                         </a:uFill>
                         <a:latin typeface="Arial"/>
@@ -2416,7 +2815,8 @@
               <a:tr h="487080">
                 <a:tc>
                   <a:txBody>
-                    <a:bodyPr lIns="169920" rIns="169920" tIns="0" bIns="0"/>
+                    <a:bodyPr/>
+                    <a:lstStyle/>
                     <a:p>
                       <a:pPr>
                         <a:lnSpc>
@@ -2424,13 +2824,13 @@
                         </a:lnSpc>
                       </a:pPr>
                       <a:r>
-                        <a:rPr b="0" lang="ru-RU" sz="3000" spc="-1" strike="noStrike">
+                        <a:rPr lang="ru-RU" sz="3000" b="0" strike="noStrike" spc="-1">
                           <a:solidFill>
                             <a:srgbClr val="000000"/>
                           </a:solidFill>
                           <a:uFill>
                             <a:solidFill>
-                              <a:srgbClr val="ffffff"/>
+                              <a:srgbClr val="FFFFFF"/>
                             </a:solidFill>
                           </a:uFill>
                           <a:latin typeface="Calibri"/>
@@ -2438,13 +2838,13 @@
                         </a:rPr>
                         <a:t>Наклон</a:t>
                       </a:r>
-                      <a:endParaRPr b="0" lang="ru-RU" sz="1800" spc="-1" strike="noStrike">
+                      <a:endParaRPr lang="ru-RU" sz="1800" b="0" strike="noStrike" spc="-1">
                         <a:solidFill>
                           <a:srgbClr val="000000"/>
                         </a:solidFill>
                         <a:uFill>
                           <a:solidFill>
-                            <a:srgbClr val="ffffff"/>
+                            <a:srgbClr val="FFFFFF"/>
                           </a:solidFill>
                         </a:uFill>
                         <a:latin typeface="Arial"/>
@@ -2477,7 +2877,8 @@
                 </a:tc>
                 <a:tc>
                   <a:txBody>
-                    <a:bodyPr lIns="169920" rIns="169920" tIns="0" bIns="0"/>
+                    <a:bodyPr/>
+                    <a:lstStyle/>
                     <a:p>
                       <a:pPr>
                         <a:lnSpc>
@@ -2485,13 +2886,13 @@
                         </a:lnSpc>
                       </a:pPr>
                       <a:r>
-                        <a:rPr b="0" lang="ru-RU" sz="3000" spc="-1" strike="noStrike">
+                        <a:rPr lang="ru-RU" sz="3000" b="0" strike="noStrike" spc="-1">
                           <a:solidFill>
                             <a:srgbClr val="000000"/>
                           </a:solidFill>
                           <a:uFill>
                             <a:solidFill>
-                              <a:srgbClr val="ffffff"/>
+                              <a:srgbClr val="FFFFFF"/>
                             </a:solidFill>
                           </a:uFill>
                           <a:latin typeface="Calibri"/>
@@ -2499,13 +2900,13 @@
                         </a:rPr>
                         <a:t> </a:t>
                       </a:r>
-                      <a:endParaRPr b="0" lang="ru-RU" sz="1800" spc="-1" strike="noStrike">
+                      <a:endParaRPr lang="ru-RU" sz="1800" b="0" strike="noStrike" spc="-1">
                         <a:solidFill>
                           <a:srgbClr val="000000"/>
                         </a:solidFill>
                         <a:uFill>
                           <a:solidFill>
-                            <a:srgbClr val="ffffff"/>
+                            <a:srgbClr val="FFFFFF"/>
                           </a:solidFill>
                         </a:uFill>
                         <a:latin typeface="Arial"/>
@@ -2538,7 +2939,8 @@
                 </a:tc>
                 <a:tc>
                   <a:txBody>
-                    <a:bodyPr lIns="169920" rIns="169920" tIns="0" bIns="0"/>
+                    <a:bodyPr/>
+                    <a:lstStyle/>
                     <a:p>
                       <a:pPr>
                         <a:lnSpc>
@@ -2546,13 +2948,13 @@
                         </a:lnSpc>
                       </a:pPr>
                       <a:r>
-                        <a:rPr b="0" lang="ru-RU" sz="3000" spc="-1" strike="noStrike">
+                        <a:rPr lang="ru-RU" sz="3000" b="0" strike="noStrike" spc="-1">
                           <a:solidFill>
                             <a:srgbClr val="000000"/>
                           </a:solidFill>
                           <a:uFill>
                             <a:solidFill>
-                              <a:srgbClr val="ffffff"/>
+                              <a:srgbClr val="FFFFFF"/>
                             </a:solidFill>
                           </a:uFill>
                           <a:latin typeface="Calibri"/>
@@ -2560,13 +2962,13 @@
                         </a:rPr>
                         <a:t>13%</a:t>
                       </a:r>
-                      <a:endParaRPr b="0" lang="ru-RU" sz="1800" spc="-1" strike="noStrike">
+                      <a:endParaRPr lang="ru-RU" sz="1800" b="0" strike="noStrike" spc="-1">
                         <a:solidFill>
                           <a:srgbClr val="000000"/>
                         </a:solidFill>
                         <a:uFill>
                           <a:solidFill>
-                            <a:srgbClr val="ffffff"/>
+                            <a:srgbClr val="FFFFFF"/>
                           </a:solidFill>
                         </a:uFill>
                         <a:latin typeface="Arial"/>
@@ -2601,7 +3003,8 @@
               <a:tr h="487080">
                 <a:tc>
                   <a:txBody>
-                    <a:bodyPr lIns="169920" rIns="169920" tIns="0" bIns="0"/>
+                    <a:bodyPr/>
+                    <a:lstStyle/>
                     <a:p>
                       <a:pPr>
                         <a:lnSpc>
@@ -2609,13 +3012,13 @@
                         </a:lnSpc>
                       </a:pPr>
                       <a:r>
-                        <a:rPr b="0" lang="ru-RU" sz="3000" spc="-1" strike="noStrike">
+                        <a:rPr lang="ru-RU" sz="3000" b="0" strike="noStrike" spc="-1">
                           <a:solidFill>
                             <a:srgbClr val="000000"/>
                           </a:solidFill>
                           <a:uFill>
                             <a:solidFill>
-                              <a:srgbClr val="ffffff"/>
+                              <a:srgbClr val="FFFFFF"/>
                             </a:solidFill>
                           </a:uFill>
                           <a:latin typeface="Calibri"/>
@@ -2623,13 +3026,13 @@
                         </a:rPr>
                         <a:t> </a:t>
                       </a:r>
-                      <a:endParaRPr b="0" lang="ru-RU" sz="1800" spc="-1" strike="noStrike">
+                      <a:endParaRPr lang="ru-RU" sz="1800" b="0" strike="noStrike" spc="-1">
                         <a:solidFill>
                           <a:srgbClr val="000000"/>
                         </a:solidFill>
                         <a:uFill>
                           <a:solidFill>
-                            <a:srgbClr val="ffffff"/>
+                            <a:srgbClr val="FFFFFF"/>
                           </a:solidFill>
                         </a:uFill>
                         <a:latin typeface="Arial"/>
@@ -2662,7 +3065,8 @@
                 </a:tc>
                 <a:tc>
                   <a:txBody>
-                    <a:bodyPr lIns="169920" rIns="169920" tIns="0" bIns="0"/>
+                    <a:bodyPr/>
+                    <a:lstStyle/>
                     <a:p>
                       <a:pPr>
                         <a:lnSpc>
@@ -2670,13 +3074,13 @@
                         </a:lnSpc>
                       </a:pPr>
                       <a:r>
-                        <a:rPr b="0" lang="ru-RU" sz="3000" spc="-1" strike="noStrike">
+                        <a:rPr lang="ru-RU" sz="3000" b="0" strike="noStrike" spc="-1">
                           <a:solidFill>
                             <a:srgbClr val="000000"/>
                           </a:solidFill>
                           <a:uFill>
                             <a:solidFill>
-                              <a:srgbClr val="ffffff"/>
+                              <a:srgbClr val="FFFFFF"/>
                             </a:solidFill>
                           </a:uFill>
                           <a:latin typeface="Calibri"/>
@@ -2684,13 +3088,13 @@
                         </a:rPr>
                         <a:t>наклон символов;</a:t>
                       </a:r>
-                      <a:endParaRPr b="0" lang="ru-RU" sz="1800" spc="-1" strike="noStrike">
+                      <a:endParaRPr lang="ru-RU" sz="1800" b="0" strike="noStrike" spc="-1">
                         <a:solidFill>
                           <a:srgbClr val="000000"/>
                         </a:solidFill>
                         <a:uFill>
                           <a:solidFill>
-                            <a:srgbClr val="ffffff"/>
+                            <a:srgbClr val="FFFFFF"/>
                           </a:solidFill>
                         </a:uFill>
                         <a:latin typeface="Arial"/>
@@ -2723,7 +3127,8 @@
                 </a:tc>
                 <a:tc>
                   <a:txBody>
-                    <a:bodyPr lIns="169920" rIns="169920" tIns="0" bIns="0"/>
+                    <a:bodyPr/>
+                    <a:lstStyle/>
                     <a:p>
                       <a:pPr>
                         <a:lnSpc>
@@ -2731,13 +3136,13 @@
                         </a:lnSpc>
                       </a:pPr>
                       <a:r>
-                        <a:rPr b="0" lang="ru-RU" sz="3000" spc="-1" strike="noStrike">
+                        <a:rPr lang="ru-RU" sz="3000" b="0" strike="noStrike" spc="-1">
                           <a:solidFill>
                             <a:srgbClr val="000000"/>
                           </a:solidFill>
                           <a:uFill>
                             <a:solidFill>
-                              <a:srgbClr val="ffffff"/>
+                              <a:srgbClr val="FFFFFF"/>
                             </a:solidFill>
                           </a:uFill>
                           <a:latin typeface="Calibri"/>
@@ -2745,13 +3150,13 @@
                         </a:rPr>
                         <a:t>14%</a:t>
                       </a:r>
-                      <a:endParaRPr b="0" lang="ru-RU" sz="1800" spc="-1" strike="noStrike">
+                      <a:endParaRPr lang="ru-RU" sz="1800" b="0" strike="noStrike" spc="-1">
                         <a:solidFill>
                           <a:srgbClr val="000000"/>
                         </a:solidFill>
                         <a:uFill>
                           <a:solidFill>
-                            <a:srgbClr val="ffffff"/>
+                            <a:srgbClr val="FFFFFF"/>
                           </a:solidFill>
                         </a:uFill>
                         <a:latin typeface="Arial"/>
@@ -2786,7 +3191,8 @@
               <a:tr h="487080">
                 <a:tc>
                   <a:txBody>
-                    <a:bodyPr lIns="169920" rIns="169920" tIns="0" bIns="0"/>
+                    <a:bodyPr/>
+                    <a:lstStyle/>
                     <a:p>
                       <a:pPr>
                         <a:lnSpc>
@@ -2794,13 +3200,13 @@
                         </a:lnSpc>
                       </a:pPr>
                       <a:r>
-                        <a:rPr b="0" lang="ru-RU" sz="3000" spc="-1" strike="noStrike">
+                        <a:rPr lang="ru-RU" sz="3000" b="0" strike="noStrike" spc="-1">
                           <a:solidFill>
                             <a:srgbClr val="000000"/>
                           </a:solidFill>
                           <a:uFill>
                             <a:solidFill>
-                              <a:srgbClr val="ffffff"/>
+                              <a:srgbClr val="FFFFFF"/>
                             </a:solidFill>
                           </a:uFill>
                           <a:latin typeface="Calibri"/>
@@ -2808,13 +3214,13 @@
                         </a:rPr>
                         <a:t> </a:t>
                       </a:r>
-                      <a:endParaRPr b="0" lang="ru-RU" sz="1800" spc="-1" strike="noStrike">
+                      <a:endParaRPr lang="ru-RU" sz="1800" b="0" strike="noStrike" spc="-1">
                         <a:solidFill>
                           <a:srgbClr val="000000"/>
                         </a:solidFill>
                         <a:uFill>
                           <a:solidFill>
-                            <a:srgbClr val="ffffff"/>
+                            <a:srgbClr val="FFFFFF"/>
                           </a:solidFill>
                         </a:uFill>
                         <a:latin typeface="Arial"/>
@@ -2847,7 +3253,8 @@
                 </a:tc>
                 <a:tc>
                   <a:txBody>
-                    <a:bodyPr lIns="169920" rIns="169920" tIns="0" bIns="0"/>
+                    <a:bodyPr/>
+                    <a:lstStyle/>
                     <a:p>
                       <a:pPr>
                         <a:lnSpc>
@@ -2855,13 +3262,13 @@
                         </a:lnSpc>
                       </a:pPr>
                       <a:r>
-                        <a:rPr b="0" lang="ru-RU" sz="3000" spc="-1" strike="noStrike">
+                        <a:rPr lang="ru-RU" sz="3000" b="0" strike="noStrike" spc="-1">
                           <a:solidFill>
                             <a:srgbClr val="000000"/>
                           </a:solidFill>
                           <a:uFill>
                             <a:solidFill>
-                              <a:srgbClr val="ffffff"/>
+                              <a:srgbClr val="FFFFFF"/>
                             </a:solidFill>
                           </a:uFill>
                           <a:latin typeface="Calibri"/>
@@ -2869,13 +3276,13 @@
                         </a:rPr>
                         <a:t>наклон строк</a:t>
                       </a:r>
-                      <a:endParaRPr b="0" lang="ru-RU" sz="1800" spc="-1" strike="noStrike">
+                      <a:endParaRPr lang="ru-RU" sz="1800" b="0" strike="noStrike" spc="-1">
                         <a:solidFill>
                           <a:srgbClr val="000000"/>
                         </a:solidFill>
                         <a:uFill>
                           <a:solidFill>
-                            <a:srgbClr val="ffffff"/>
+                            <a:srgbClr val="FFFFFF"/>
                           </a:solidFill>
                         </a:uFill>
                         <a:latin typeface="Arial"/>
@@ -2908,7 +3315,8 @@
                 </a:tc>
                 <a:tc>
                   <a:txBody>
-                    <a:bodyPr lIns="169920" rIns="169920" tIns="0" bIns="0"/>
+                    <a:bodyPr/>
+                    <a:lstStyle/>
                     <a:p>
                       <a:pPr>
                         <a:lnSpc>
@@ -2916,13 +3324,13 @@
                         </a:lnSpc>
                       </a:pPr>
                       <a:r>
-                        <a:rPr b="0" lang="ru-RU" sz="3000" spc="-1" strike="noStrike">
+                        <a:rPr lang="ru-RU" sz="3000" b="0" strike="noStrike" spc="-1">
                           <a:solidFill>
                             <a:srgbClr val="000000"/>
                           </a:solidFill>
                           <a:uFill>
                             <a:solidFill>
-                              <a:srgbClr val="ffffff"/>
+                              <a:srgbClr val="FFFFFF"/>
                             </a:solidFill>
                           </a:uFill>
                           <a:latin typeface="Calibri"/>
@@ -2930,13 +3338,13 @@
                         </a:rPr>
                         <a:t>12%</a:t>
                       </a:r>
-                      <a:endParaRPr b="0" lang="ru-RU" sz="1800" spc="-1" strike="noStrike">
+                      <a:endParaRPr lang="ru-RU" sz="1800" b="0" strike="noStrike" spc="-1">
                         <a:solidFill>
                           <a:srgbClr val="000000"/>
                         </a:solidFill>
                         <a:uFill>
                           <a:solidFill>
-                            <a:srgbClr val="ffffff"/>
+                            <a:srgbClr val="FFFFFF"/>
                           </a:solidFill>
                         </a:uFill>
                         <a:latin typeface="Arial"/>
@@ -2971,7 +3379,8 @@
               <a:tr h="487080">
                 <a:tc>
                   <a:txBody>
-                    <a:bodyPr lIns="169920" rIns="169920" tIns="0" bIns="0"/>
+                    <a:bodyPr/>
+                    <a:lstStyle/>
                     <a:p>
                       <a:pPr>
                         <a:lnSpc>
@@ -2979,13 +3388,13 @@
                         </a:lnSpc>
                       </a:pPr>
                       <a:r>
-                        <a:rPr b="0" lang="ru-RU" sz="3000" spc="-1" strike="noStrike">
+                        <a:rPr lang="ru-RU" sz="3000" b="0" strike="noStrike" spc="-1">
                           <a:solidFill>
                             <a:srgbClr val="000000"/>
                           </a:solidFill>
                           <a:uFill>
                             <a:solidFill>
-                              <a:srgbClr val="ffffff"/>
+                              <a:srgbClr val="FFFFFF"/>
                             </a:solidFill>
                           </a:uFill>
                           <a:latin typeface="Calibri"/>
@@ -2993,13 +3402,13 @@
                         </a:rPr>
                         <a:t>Интервал</a:t>
                       </a:r>
-                      <a:endParaRPr b="0" lang="ru-RU" sz="1800" spc="-1" strike="noStrike">
+                      <a:endParaRPr lang="ru-RU" sz="1800" b="0" strike="noStrike" spc="-1">
                         <a:solidFill>
                           <a:srgbClr val="000000"/>
                         </a:solidFill>
                         <a:uFill>
                           <a:solidFill>
-                            <a:srgbClr val="ffffff"/>
+                            <a:srgbClr val="FFFFFF"/>
                           </a:solidFill>
                         </a:uFill>
                         <a:latin typeface="Arial"/>
@@ -3032,7 +3441,8 @@
                 </a:tc>
                 <a:tc>
                   <a:txBody>
-                    <a:bodyPr lIns="169920" rIns="169920" tIns="0" bIns="0"/>
+                    <a:bodyPr/>
+                    <a:lstStyle/>
                     <a:p>
                       <a:pPr>
                         <a:lnSpc>
@@ -3040,13 +3450,13 @@
                         </a:lnSpc>
                       </a:pPr>
                       <a:r>
-                        <a:rPr b="0" lang="ru-RU" sz="3000" spc="-1" strike="noStrike">
+                        <a:rPr lang="ru-RU" sz="3000" b="0" strike="noStrike" spc="-1">
                           <a:solidFill>
                             <a:srgbClr val="000000"/>
                           </a:solidFill>
                           <a:uFill>
                             <a:solidFill>
-                              <a:srgbClr val="ffffff"/>
+                              <a:srgbClr val="FFFFFF"/>
                             </a:solidFill>
                           </a:uFill>
                           <a:latin typeface="Calibri"/>
@@ -3054,13 +3464,13 @@
                         </a:rPr>
                         <a:t> </a:t>
                       </a:r>
-                      <a:endParaRPr b="0" lang="ru-RU" sz="1800" spc="-1" strike="noStrike">
+                      <a:endParaRPr lang="ru-RU" sz="1800" b="0" strike="noStrike" spc="-1">
                         <a:solidFill>
                           <a:srgbClr val="000000"/>
                         </a:solidFill>
                         <a:uFill>
                           <a:solidFill>
-                            <a:srgbClr val="ffffff"/>
+                            <a:srgbClr val="FFFFFF"/>
                           </a:solidFill>
                         </a:uFill>
                         <a:latin typeface="Arial"/>
@@ -3093,7 +3503,8 @@
                 </a:tc>
                 <a:tc>
                   <a:txBody>
-                    <a:bodyPr lIns="169920" rIns="169920" tIns="0" bIns="0"/>
+                    <a:bodyPr/>
+                    <a:lstStyle/>
                     <a:p>
                       <a:pPr>
                         <a:lnSpc>
@@ -3101,13 +3512,13 @@
                         </a:lnSpc>
                       </a:pPr>
                       <a:r>
-                        <a:rPr b="0" lang="ru-RU" sz="3000" spc="-1" strike="noStrike">
+                        <a:rPr lang="ru-RU" sz="3000" b="0" strike="noStrike" spc="-1">
                           <a:solidFill>
                             <a:srgbClr val="000000"/>
                           </a:solidFill>
                           <a:uFill>
                             <a:solidFill>
-                              <a:srgbClr val="ffffff"/>
+                              <a:srgbClr val="FFFFFF"/>
                             </a:solidFill>
                           </a:uFill>
                           <a:latin typeface="Calibri"/>
@@ -3115,13 +3526,13 @@
                         </a:rPr>
                         <a:t>7%</a:t>
                       </a:r>
-                      <a:endParaRPr b="0" lang="ru-RU" sz="1800" spc="-1" strike="noStrike">
+                      <a:endParaRPr lang="ru-RU" sz="1800" b="0" strike="noStrike" spc="-1">
                         <a:solidFill>
                           <a:srgbClr val="000000"/>
                         </a:solidFill>
                         <a:uFill>
                           <a:solidFill>
-                            <a:srgbClr val="ffffff"/>
+                            <a:srgbClr val="FFFFFF"/>
                           </a:solidFill>
                         </a:uFill>
                         <a:latin typeface="Arial"/>
@@ -3156,7 +3567,8 @@
               <a:tr h="487080">
                 <a:tc>
                   <a:txBody>
-                    <a:bodyPr lIns="169920" rIns="169920" tIns="0" bIns="0"/>
+                    <a:bodyPr/>
+                    <a:lstStyle/>
                     <a:p>
                       <a:pPr>
                         <a:lnSpc>
@@ -3164,13 +3576,13 @@
                         </a:lnSpc>
                       </a:pPr>
                       <a:r>
-                        <a:rPr b="0" lang="ru-RU" sz="3000" spc="-1" strike="noStrike">
+                        <a:rPr lang="ru-RU" sz="3000" b="0" strike="noStrike" spc="-1">
                           <a:solidFill>
                             <a:srgbClr val="000000"/>
                           </a:solidFill>
                           <a:uFill>
                             <a:solidFill>
-                              <a:srgbClr val="ffffff"/>
+                              <a:srgbClr val="FFFFFF"/>
                             </a:solidFill>
                           </a:uFill>
                           <a:latin typeface="Calibri"/>
@@ -3178,13 +3590,13 @@
                         </a:rPr>
                         <a:t> </a:t>
                       </a:r>
-                      <a:endParaRPr b="0" lang="ru-RU" sz="1800" spc="-1" strike="noStrike">
+                      <a:endParaRPr lang="ru-RU" sz="1800" b="0" strike="noStrike" spc="-1">
                         <a:solidFill>
                           <a:srgbClr val="000000"/>
                         </a:solidFill>
                         <a:uFill>
                           <a:solidFill>
-                            <a:srgbClr val="ffffff"/>
+                            <a:srgbClr val="FFFFFF"/>
                           </a:solidFill>
                         </a:uFill>
                         <a:latin typeface="Arial"/>
@@ -3217,7 +3629,8 @@
                 </a:tc>
                 <a:tc>
                   <a:txBody>
-                    <a:bodyPr lIns="169920" rIns="169920" tIns="0" bIns="0"/>
+                    <a:bodyPr/>
+                    <a:lstStyle/>
                     <a:p>
                       <a:pPr>
                         <a:lnSpc>
@@ -3225,13 +3638,13 @@
                         </a:lnSpc>
                       </a:pPr>
                       <a:r>
-                        <a:rPr b="0" lang="ru-RU" sz="3000" spc="-1" strike="noStrike">
+                        <a:rPr lang="ru-RU" sz="3000" b="0" strike="noStrike" spc="-1">
                           <a:solidFill>
                             <a:srgbClr val="000000"/>
                           </a:solidFill>
                           <a:uFill>
                             <a:solidFill>
-                              <a:srgbClr val="ffffff"/>
+                              <a:srgbClr val="FFFFFF"/>
                             </a:solidFill>
                           </a:uFill>
                           <a:latin typeface="Calibri"/>
@@ -3239,13 +3652,13 @@
                         </a:rPr>
                         <a:t>интервал между символами</a:t>
                       </a:r>
-                      <a:endParaRPr b="0" lang="ru-RU" sz="1800" spc="-1" strike="noStrike">
+                      <a:endParaRPr lang="ru-RU" sz="1800" b="0" strike="noStrike" spc="-1">
                         <a:solidFill>
                           <a:srgbClr val="000000"/>
                         </a:solidFill>
                         <a:uFill>
                           <a:solidFill>
-                            <a:srgbClr val="ffffff"/>
+                            <a:srgbClr val="FFFFFF"/>
                           </a:solidFill>
                         </a:uFill>
                         <a:latin typeface="Arial"/>
@@ -3278,7 +3691,8 @@
                 </a:tc>
                 <a:tc>
                   <a:txBody>
-                    <a:bodyPr lIns="169920" rIns="169920" tIns="0" bIns="0"/>
+                    <a:bodyPr/>
+                    <a:lstStyle/>
                     <a:p>
                       <a:pPr>
                         <a:lnSpc>
@@ -3286,13 +3700,13 @@
                         </a:lnSpc>
                       </a:pPr>
                       <a:r>
-                        <a:rPr b="0" lang="ru-RU" sz="3000" spc="-1" strike="noStrike">
+                        <a:rPr lang="ru-RU" sz="3000" b="0" strike="noStrike" spc="-1">
                           <a:solidFill>
                             <a:srgbClr val="000000"/>
                           </a:solidFill>
                           <a:uFill>
                             <a:solidFill>
-                              <a:srgbClr val="ffffff"/>
+                              <a:srgbClr val="FFFFFF"/>
                             </a:solidFill>
                           </a:uFill>
                           <a:latin typeface="Calibri"/>
@@ -3300,13 +3714,13 @@
                         </a:rPr>
                         <a:t>10%</a:t>
                       </a:r>
-                      <a:endParaRPr b="0" lang="ru-RU" sz="1800" spc="-1" strike="noStrike">
+                      <a:endParaRPr lang="ru-RU" sz="1800" b="0" strike="noStrike" spc="-1">
                         <a:solidFill>
                           <a:srgbClr val="000000"/>
                         </a:solidFill>
                         <a:uFill>
                           <a:solidFill>
-                            <a:srgbClr val="ffffff"/>
+                            <a:srgbClr val="FFFFFF"/>
                           </a:solidFill>
                         </a:uFill>
                         <a:latin typeface="Arial"/>
@@ -3341,7 +3755,8 @@
               <a:tr h="487080">
                 <a:tc>
                   <a:txBody>
-                    <a:bodyPr lIns="169920" rIns="169920" tIns="0" bIns="0"/>
+                    <a:bodyPr/>
+                    <a:lstStyle/>
                     <a:p>
                       <a:pPr>
                         <a:lnSpc>
@@ -3349,13 +3764,13 @@
                         </a:lnSpc>
                       </a:pPr>
                       <a:r>
-                        <a:rPr b="0" lang="ru-RU" sz="3000" spc="-1" strike="noStrike">
+                        <a:rPr lang="ru-RU" sz="3000" b="0" strike="noStrike" spc="-1">
                           <a:solidFill>
                             <a:srgbClr val="000000"/>
                           </a:solidFill>
                           <a:uFill>
                             <a:solidFill>
-                              <a:srgbClr val="ffffff"/>
+                              <a:srgbClr val="FFFFFF"/>
                             </a:solidFill>
                           </a:uFill>
                           <a:latin typeface="Calibri"/>
@@ -3363,13 +3778,13 @@
                         </a:rPr>
                         <a:t> </a:t>
                       </a:r>
-                      <a:endParaRPr b="0" lang="ru-RU" sz="1800" spc="-1" strike="noStrike">
+                      <a:endParaRPr lang="ru-RU" sz="1800" b="0" strike="noStrike" spc="-1">
                         <a:solidFill>
                           <a:srgbClr val="000000"/>
                         </a:solidFill>
                         <a:uFill>
                           <a:solidFill>
-                            <a:srgbClr val="ffffff"/>
+                            <a:srgbClr val="FFFFFF"/>
                           </a:solidFill>
                         </a:uFill>
                         <a:latin typeface="Arial"/>
@@ -3402,7 +3817,8 @@
                 </a:tc>
                 <a:tc>
                   <a:txBody>
-                    <a:bodyPr lIns="169920" rIns="169920" tIns="0" bIns="0"/>
+                    <a:bodyPr/>
+                    <a:lstStyle/>
                     <a:p>
                       <a:pPr>
                         <a:lnSpc>
@@ -3410,13 +3826,13 @@
                         </a:lnSpc>
                       </a:pPr>
                       <a:r>
-                        <a:rPr b="0" lang="ru-RU" sz="3000" spc="-1" strike="noStrike">
+                        <a:rPr lang="ru-RU" sz="3000" b="0" strike="noStrike" spc="-1">
                           <a:solidFill>
                             <a:srgbClr val="000000"/>
                           </a:solidFill>
                           <a:uFill>
                             <a:solidFill>
-                              <a:srgbClr val="ffffff"/>
+                              <a:srgbClr val="FFFFFF"/>
                             </a:solidFill>
                           </a:uFill>
                           <a:latin typeface="Calibri"/>
@@ -3424,13 +3840,13 @@
                         </a:rPr>
                         <a:t>интервал между словами</a:t>
                       </a:r>
-                      <a:endParaRPr b="0" lang="ru-RU" sz="1800" spc="-1" strike="noStrike">
+                      <a:endParaRPr lang="ru-RU" sz="1800" b="0" strike="noStrike" spc="-1">
                         <a:solidFill>
                           <a:srgbClr val="000000"/>
                         </a:solidFill>
                         <a:uFill>
                           <a:solidFill>
-                            <a:srgbClr val="ffffff"/>
+                            <a:srgbClr val="FFFFFF"/>
                           </a:solidFill>
                         </a:uFill>
                         <a:latin typeface="Arial"/>
@@ -3463,7 +3879,8 @@
                 </a:tc>
                 <a:tc>
                   <a:txBody>
-                    <a:bodyPr lIns="169920" rIns="169920" tIns="0" bIns="0"/>
+                    <a:bodyPr/>
+                    <a:lstStyle/>
                     <a:p>
                       <a:pPr>
                         <a:lnSpc>
@@ -3471,13 +3888,13 @@
                         </a:lnSpc>
                       </a:pPr>
                       <a:r>
-                        <a:rPr b="0" lang="ru-RU" sz="3000" spc="-1" strike="noStrike">
+                        <a:rPr lang="ru-RU" sz="3000" b="0" strike="noStrike" spc="-1">
                           <a:solidFill>
                             <a:srgbClr val="000000"/>
                           </a:solidFill>
                           <a:uFill>
                             <a:solidFill>
-                              <a:srgbClr val="ffffff"/>
+                              <a:srgbClr val="FFFFFF"/>
                             </a:solidFill>
                           </a:uFill>
                           <a:latin typeface="Calibri"/>
@@ -3485,13 +3902,13 @@
                         </a:rPr>
                         <a:t>7%</a:t>
                       </a:r>
-                      <a:endParaRPr b="0" lang="ru-RU" sz="1800" spc="-1" strike="noStrike">
+                      <a:endParaRPr lang="ru-RU" sz="1800" b="0" strike="noStrike" spc="-1">
                         <a:solidFill>
                           <a:srgbClr val="000000"/>
                         </a:solidFill>
                         <a:uFill>
                           <a:solidFill>
-                            <a:srgbClr val="ffffff"/>
+                            <a:srgbClr val="FFFFFF"/>
                           </a:solidFill>
                         </a:uFill>
                         <a:latin typeface="Arial"/>
@@ -3526,7 +3943,8 @@
               <a:tr h="487080">
                 <a:tc>
                   <a:txBody>
-                    <a:bodyPr lIns="169920" rIns="169920" tIns="0" bIns="0"/>
+                    <a:bodyPr/>
+                    <a:lstStyle/>
                     <a:p>
                       <a:pPr>
                         <a:lnSpc>
@@ -3534,13 +3952,13 @@
                         </a:lnSpc>
                       </a:pPr>
                       <a:r>
-                        <a:rPr b="0" lang="ru-RU" sz="3000" spc="-1" strike="noStrike">
+                        <a:rPr lang="ru-RU" sz="3000" b="0" strike="noStrike" spc="-1">
                           <a:solidFill>
                             <a:srgbClr val="000000"/>
                           </a:solidFill>
                           <a:uFill>
                             <a:solidFill>
-                              <a:srgbClr val="ffffff"/>
+                              <a:srgbClr val="FFFFFF"/>
                             </a:solidFill>
                           </a:uFill>
                           <a:latin typeface="Calibri"/>
@@ -3548,13 +3966,13 @@
                         </a:rPr>
                         <a:t> </a:t>
                       </a:r>
-                      <a:endParaRPr b="0" lang="ru-RU" sz="1800" spc="-1" strike="noStrike">
+                      <a:endParaRPr lang="ru-RU" sz="1800" b="0" strike="noStrike" spc="-1">
                         <a:solidFill>
                           <a:srgbClr val="000000"/>
                         </a:solidFill>
                         <a:uFill>
                           <a:solidFill>
-                            <a:srgbClr val="ffffff"/>
+                            <a:srgbClr val="FFFFFF"/>
                           </a:solidFill>
                         </a:uFill>
                         <a:latin typeface="Arial"/>
@@ -3587,7 +4005,8 @@
                 </a:tc>
                 <a:tc>
                   <a:txBody>
-                    <a:bodyPr lIns="169920" rIns="169920" tIns="0" bIns="0"/>
+                    <a:bodyPr/>
+                    <a:lstStyle/>
                     <a:p>
                       <a:pPr>
                         <a:lnSpc>
@@ -3595,13 +4014,13 @@
                         </a:lnSpc>
                       </a:pPr>
                       <a:r>
-                        <a:rPr b="0" lang="ru-RU" sz="3000" spc="-1" strike="noStrike">
+                        <a:rPr lang="ru-RU" sz="3000" b="0" strike="noStrike" spc="-1">
                           <a:solidFill>
                             <a:srgbClr val="000000"/>
                           </a:solidFill>
                           <a:uFill>
                             <a:solidFill>
-                              <a:srgbClr val="ffffff"/>
+                              <a:srgbClr val="FFFFFF"/>
                             </a:solidFill>
                           </a:uFill>
                           <a:latin typeface="Calibri"/>
@@ -3609,13 +4028,13 @@
                         </a:rPr>
                         <a:t>интервал между строками</a:t>
                       </a:r>
-                      <a:endParaRPr b="0" lang="ru-RU" sz="1800" spc="-1" strike="noStrike">
+                      <a:endParaRPr lang="ru-RU" sz="1800" b="0" strike="noStrike" spc="-1">
                         <a:solidFill>
                           <a:srgbClr val="000000"/>
                         </a:solidFill>
                         <a:uFill>
                           <a:solidFill>
-                            <a:srgbClr val="ffffff"/>
+                            <a:srgbClr val="FFFFFF"/>
                           </a:solidFill>
                         </a:uFill>
                         <a:latin typeface="Arial"/>
@@ -3648,7 +4067,8 @@
                 </a:tc>
                 <a:tc>
                   <a:txBody>
-                    <a:bodyPr lIns="169920" rIns="169920" tIns="0" bIns="0"/>
+                    <a:bodyPr/>
+                    <a:lstStyle/>
                     <a:p>
                       <a:pPr>
                         <a:lnSpc>
@@ -3656,13 +4076,13 @@
                         </a:lnSpc>
                       </a:pPr>
                       <a:r>
-                        <a:rPr b="0" lang="ru-RU" sz="3000" spc="-1" strike="noStrike">
+                        <a:rPr lang="ru-RU" sz="3000" b="0" strike="noStrike" spc="-1">
                           <a:solidFill>
                             <a:srgbClr val="000000"/>
                           </a:solidFill>
                           <a:uFill>
                             <a:solidFill>
-                              <a:srgbClr val="ffffff"/>
+                              <a:srgbClr val="FFFFFF"/>
                             </a:solidFill>
                           </a:uFill>
                           <a:latin typeface="Calibri"/>
@@ -3670,13 +4090,13 @@
                         </a:rPr>
                         <a:t>4%</a:t>
                       </a:r>
-                      <a:endParaRPr b="0" lang="ru-RU" sz="1800" spc="-1" strike="noStrike">
+                      <a:endParaRPr lang="ru-RU" sz="1800" b="0" strike="noStrike" spc="-1">
                         <a:solidFill>
                           <a:srgbClr val="000000"/>
                         </a:solidFill>
                         <a:uFill>
                           <a:solidFill>
-                            <a:srgbClr val="ffffff"/>
+                            <a:srgbClr val="FFFFFF"/>
                           </a:solidFill>
                         </a:uFill>
                         <a:latin typeface="Arial"/>
@@ -3711,7 +4131,8 @@
               <a:tr h="487080">
                 <a:tc>
                   <a:txBody>
-                    <a:bodyPr lIns="169920" rIns="169920" tIns="0" bIns="0"/>
+                    <a:bodyPr/>
+                    <a:lstStyle/>
                     <a:p>
                       <a:pPr>
                         <a:lnSpc>
@@ -3719,13 +4140,13 @@
                         </a:lnSpc>
                       </a:pPr>
                       <a:r>
-                        <a:rPr b="0" lang="ru-RU" sz="3000" spc="-1" strike="noStrike">
+                        <a:rPr lang="ru-RU" sz="3000" b="0" strike="noStrike" spc="-1">
                           <a:solidFill>
                             <a:srgbClr val="000000"/>
                           </a:solidFill>
                           <a:uFill>
                             <a:solidFill>
-                              <a:srgbClr val="ffffff"/>
+                              <a:srgbClr val="FFFFFF"/>
                             </a:solidFill>
                           </a:uFill>
                           <a:latin typeface="Calibri"/>
@@ -3733,13 +4154,13 @@
                         </a:rPr>
                         <a:t>Прочие</a:t>
                       </a:r>
-                      <a:endParaRPr b="0" lang="ru-RU" sz="1800" spc="-1" strike="noStrike">
+                      <a:endParaRPr lang="ru-RU" sz="1800" b="0" strike="noStrike" spc="-1">
                         <a:solidFill>
                           <a:srgbClr val="000000"/>
                         </a:solidFill>
                         <a:uFill>
                           <a:solidFill>
-                            <a:srgbClr val="ffffff"/>
+                            <a:srgbClr val="FFFFFF"/>
                           </a:solidFill>
                         </a:uFill>
                         <a:latin typeface="Arial"/>
@@ -3772,7 +4193,8 @@
                 </a:tc>
                 <a:tc>
                   <a:txBody>
-                    <a:bodyPr lIns="169920" rIns="169920" tIns="0" bIns="0"/>
+                    <a:bodyPr/>
+                    <a:lstStyle/>
                     <a:p>
                       <a:pPr>
                         <a:lnSpc>
@@ -3780,13 +4202,13 @@
                         </a:lnSpc>
                       </a:pPr>
                       <a:r>
-                        <a:rPr b="0" lang="ru-RU" sz="3000" spc="-1" strike="noStrike">
+                        <a:rPr lang="ru-RU" sz="3000" b="0" strike="noStrike" spc="-1">
                           <a:solidFill>
                             <a:srgbClr val="000000"/>
                           </a:solidFill>
                           <a:uFill>
                             <a:solidFill>
-                              <a:srgbClr val="ffffff"/>
+                              <a:srgbClr val="FFFFFF"/>
                             </a:solidFill>
                           </a:uFill>
                           <a:latin typeface="Calibri"/>
@@ -3794,13 +4216,13 @@
                         </a:rPr>
                         <a:t> </a:t>
                       </a:r>
-                      <a:endParaRPr b="0" lang="ru-RU" sz="1800" spc="-1" strike="noStrike">
+                      <a:endParaRPr lang="ru-RU" sz="1800" b="0" strike="noStrike" spc="-1">
                         <a:solidFill>
                           <a:srgbClr val="000000"/>
                         </a:solidFill>
                         <a:uFill>
                           <a:solidFill>
-                            <a:srgbClr val="ffffff"/>
+                            <a:srgbClr val="FFFFFF"/>
                           </a:solidFill>
                         </a:uFill>
                         <a:latin typeface="Arial"/>
@@ -3833,7 +4255,8 @@
                 </a:tc>
                 <a:tc>
                   <a:txBody>
-                    <a:bodyPr lIns="169920" rIns="169920" tIns="0" bIns="0"/>
+                    <a:bodyPr/>
+                    <a:lstStyle/>
                     <a:p>
                       <a:pPr>
                         <a:lnSpc>
@@ -3841,13 +4264,13 @@
                         </a:lnSpc>
                       </a:pPr>
                       <a:r>
-                        <a:rPr b="0" lang="ru-RU" sz="3000" spc="-1" strike="noStrike">
+                        <a:rPr lang="ru-RU" sz="3000" b="0" strike="noStrike" spc="-1">
                           <a:solidFill>
                             <a:srgbClr val="000000"/>
                           </a:solidFill>
                           <a:uFill>
                             <a:solidFill>
-                              <a:srgbClr val="ffffff"/>
+                              <a:srgbClr val="FFFFFF"/>
                             </a:solidFill>
                           </a:uFill>
                           <a:latin typeface="Calibri"/>
@@ -3855,13 +4278,13 @@
                         </a:rPr>
                         <a:t>1%</a:t>
                       </a:r>
-                      <a:endParaRPr b="0" lang="ru-RU" sz="1800" spc="-1" strike="noStrike">
+                      <a:endParaRPr lang="ru-RU" sz="1800" b="0" strike="noStrike" spc="-1">
                         <a:solidFill>
                           <a:srgbClr val="000000"/>
                         </a:solidFill>
                         <a:uFill>
                           <a:solidFill>
-                            <a:srgbClr val="ffffff"/>
+                            <a:srgbClr val="FFFFFF"/>
                           </a:solidFill>
                         </a:uFill>
                         <a:latin typeface="Arial"/>
@@ -3896,7 +4319,8 @@
               <a:tr h="487080">
                 <a:tc>
                   <a:txBody>
-                    <a:bodyPr lIns="169920" rIns="169920" tIns="0" bIns="0"/>
+                    <a:bodyPr/>
+                    <a:lstStyle/>
                     <a:p>
                       <a:pPr>
                         <a:lnSpc>
@@ -3904,13 +4328,13 @@
                         </a:lnSpc>
                       </a:pPr>
                       <a:r>
-                        <a:rPr b="0" lang="ru-RU" sz="3000" spc="-1" strike="noStrike">
+                        <a:rPr lang="ru-RU" sz="3000" b="0" strike="noStrike" spc="-1">
                           <a:solidFill>
                             <a:srgbClr val="000000"/>
                           </a:solidFill>
                           <a:uFill>
                             <a:solidFill>
-                              <a:srgbClr val="ffffff"/>
+                              <a:srgbClr val="FFFFFF"/>
                             </a:solidFill>
                           </a:uFill>
                           <a:latin typeface="Calibri"/>
@@ -3918,13 +4342,13 @@
                         </a:rPr>
                         <a:t> </a:t>
                       </a:r>
-                      <a:endParaRPr b="0" lang="ru-RU" sz="1800" spc="-1" strike="noStrike">
+                      <a:endParaRPr lang="ru-RU" sz="1800" b="0" strike="noStrike" spc="-1">
                         <a:solidFill>
                           <a:srgbClr val="000000"/>
                         </a:solidFill>
                         <a:uFill>
                           <a:solidFill>
-                            <a:srgbClr val="ffffff"/>
+                            <a:srgbClr val="FFFFFF"/>
                           </a:solidFill>
                         </a:uFill>
                         <a:latin typeface="Arial"/>
@@ -3957,7 +4381,8 @@
                 </a:tc>
                 <a:tc>
                   <a:txBody>
-                    <a:bodyPr lIns="169920" rIns="169920" tIns="0" bIns="0"/>
+                    <a:bodyPr/>
+                    <a:lstStyle/>
                     <a:p>
                       <a:pPr>
                         <a:lnSpc>
@@ -3965,13 +4390,13 @@
                         </a:lnSpc>
                       </a:pPr>
                       <a:r>
-                        <a:rPr b="0" lang="ru-RU" sz="3000" spc="-1" strike="noStrike">
+                        <a:rPr lang="ru-RU" sz="3000" b="0" strike="noStrike" spc="-1">
                           <a:solidFill>
                             <a:srgbClr val="000000"/>
                           </a:solidFill>
                           <a:uFill>
                             <a:solidFill>
-                              <a:srgbClr val="ffffff"/>
+                              <a:srgbClr val="FFFFFF"/>
                             </a:solidFill>
                           </a:uFill>
                           <a:latin typeface="Calibri"/>
@@ -3979,13 +4404,13 @@
                         </a:rPr>
                         <a:t>частота текста</a:t>
                       </a:r>
-                      <a:endParaRPr b="0" lang="ru-RU" sz="1800" spc="-1" strike="noStrike">
+                      <a:endParaRPr lang="ru-RU" sz="1800" b="0" strike="noStrike" spc="-1">
                         <a:solidFill>
                           <a:srgbClr val="000000"/>
                         </a:solidFill>
                         <a:uFill>
                           <a:solidFill>
-                            <a:srgbClr val="ffffff"/>
+                            <a:srgbClr val="FFFFFF"/>
                           </a:solidFill>
                         </a:uFill>
                         <a:latin typeface="Arial"/>
@@ -4018,7 +4443,8 @@
                 </a:tc>
                 <a:tc>
                   <a:txBody>
-                    <a:bodyPr lIns="169920" rIns="169920" tIns="0" bIns="0"/>
+                    <a:bodyPr/>
+                    <a:lstStyle/>
                     <a:p>
                       <a:pPr>
                         <a:lnSpc>
@@ -4026,13 +4452,13 @@
                         </a:lnSpc>
                       </a:pPr>
                       <a:r>
-                        <a:rPr b="0" lang="ru-RU" sz="3000" spc="-1" strike="noStrike">
+                        <a:rPr lang="ru-RU" sz="3000" b="0" strike="noStrike" spc="-1">
                           <a:solidFill>
                             <a:srgbClr val="000000"/>
                           </a:solidFill>
                           <a:uFill>
                             <a:solidFill>
-                              <a:srgbClr val="ffffff"/>
+                              <a:srgbClr val="FFFFFF"/>
                             </a:solidFill>
                           </a:uFill>
                           <a:latin typeface="Calibri"/>
@@ -4040,13 +4466,13 @@
                         </a:rPr>
                         <a:t>0%</a:t>
                       </a:r>
-                      <a:endParaRPr b="0" lang="ru-RU" sz="1800" spc="-1" strike="noStrike">
+                      <a:endParaRPr lang="ru-RU" sz="1800" b="0" strike="noStrike" spc="-1">
                         <a:solidFill>
                           <a:srgbClr val="000000"/>
                         </a:solidFill>
                         <a:uFill>
                           <a:solidFill>
-                            <a:srgbClr val="ffffff"/>
+                            <a:srgbClr val="FFFFFF"/>
                           </a:solidFill>
                         </a:uFill>
                         <a:latin typeface="Arial"/>
@@ -4081,7 +4507,8 @@
               <a:tr h="487080">
                 <a:tc>
                   <a:txBody>
-                    <a:bodyPr lIns="169920" rIns="169920" tIns="0" bIns="0"/>
+                    <a:bodyPr/>
+                    <a:lstStyle/>
                     <a:p>
                       <a:pPr>
                         <a:lnSpc>
@@ -4089,13 +4516,13 @@
                         </a:lnSpc>
                       </a:pPr>
                       <a:r>
-                        <a:rPr b="0" lang="ru-RU" sz="3000" spc="-1" strike="noStrike">
+                        <a:rPr lang="ru-RU" sz="3000" b="0" strike="noStrike" spc="-1">
                           <a:solidFill>
                             <a:srgbClr val="000000"/>
                           </a:solidFill>
                           <a:uFill>
                             <a:solidFill>
-                              <a:srgbClr val="ffffff"/>
+                              <a:srgbClr val="FFFFFF"/>
                             </a:solidFill>
                           </a:uFill>
                           <a:latin typeface="Calibri"/>
@@ -4103,13 +4530,13 @@
                         </a:rPr>
                         <a:t> </a:t>
                       </a:r>
-                      <a:endParaRPr b="0" lang="ru-RU" sz="1800" spc="-1" strike="noStrike">
+                      <a:endParaRPr lang="ru-RU" sz="1800" b="0" strike="noStrike" spc="-1">
                         <a:solidFill>
                           <a:srgbClr val="000000"/>
                         </a:solidFill>
                         <a:uFill>
                           <a:solidFill>
-                            <a:srgbClr val="ffffff"/>
+                            <a:srgbClr val="FFFFFF"/>
                           </a:solidFill>
                         </a:uFill>
                         <a:latin typeface="Arial"/>
@@ -4142,7 +4569,8 @@
                 </a:tc>
                 <a:tc>
                   <a:txBody>
-                    <a:bodyPr lIns="169920" rIns="169920" tIns="0" bIns="0"/>
+                    <a:bodyPr/>
+                    <a:lstStyle/>
                     <a:p>
                       <a:pPr>
                         <a:lnSpc>
@@ -4150,13 +4578,13 @@
                         </a:lnSpc>
                       </a:pPr>
                       <a:r>
-                        <a:rPr b="0" lang="ru-RU" sz="3000" spc="-1" strike="noStrike">
+                        <a:rPr lang="ru-RU" sz="3000" b="0" strike="noStrike" spc="-1">
                           <a:solidFill>
                             <a:srgbClr val="000000"/>
                           </a:solidFill>
                           <a:uFill>
                             <a:solidFill>
-                              <a:srgbClr val="ffffff"/>
+                              <a:srgbClr val="FFFFFF"/>
                             </a:solidFill>
                           </a:uFill>
                           <a:latin typeface="Calibri"/>
@@ -4164,13 +4592,13 @@
                         </a:rPr>
                         <a:t>сила нажима</a:t>
                       </a:r>
-                      <a:endParaRPr b="0" lang="ru-RU" sz="1800" spc="-1" strike="noStrike">
+                      <a:endParaRPr lang="ru-RU" sz="1800" b="0" strike="noStrike" spc="-1">
                         <a:solidFill>
                           <a:srgbClr val="000000"/>
                         </a:solidFill>
                         <a:uFill>
                           <a:solidFill>
-                            <a:srgbClr val="ffffff"/>
+                            <a:srgbClr val="FFFFFF"/>
                           </a:solidFill>
                         </a:uFill>
                         <a:latin typeface="Arial"/>
@@ -4203,7 +4631,8 @@
                 </a:tc>
                 <a:tc>
                   <a:txBody>
-                    <a:bodyPr lIns="169920" rIns="169920" tIns="0" bIns="0"/>
+                    <a:bodyPr/>
+                    <a:lstStyle/>
                     <a:p>
                       <a:pPr>
                         <a:lnSpc>
@@ -4211,13 +4640,13 @@
                         </a:lnSpc>
                       </a:pPr>
                       <a:r>
-                        <a:rPr b="0" lang="ru-RU" sz="3000" spc="-1" strike="noStrike">
+                        <a:rPr lang="ru-RU" sz="3000" b="0" strike="noStrike" spc="-1">
                           <a:solidFill>
                             <a:srgbClr val="000000"/>
                           </a:solidFill>
                           <a:uFill>
                             <a:solidFill>
-                              <a:srgbClr val="ffffff"/>
+                              <a:srgbClr val="FFFFFF"/>
                             </a:solidFill>
                           </a:uFill>
                           <a:latin typeface="Calibri"/>
@@ -4225,13 +4654,13 @@
                         </a:rPr>
                         <a:t>2%</a:t>
                       </a:r>
-                      <a:endParaRPr b="0" lang="ru-RU" sz="1800" spc="-1" strike="noStrike">
+                      <a:endParaRPr lang="ru-RU" sz="1800" b="0" strike="noStrike" spc="-1">
                         <a:solidFill>
                           <a:srgbClr val="000000"/>
                         </a:solidFill>
                         <a:uFill>
                           <a:solidFill>
-                            <a:srgbClr val="ffffff"/>
+                            <a:srgbClr val="FFFFFF"/>
                           </a:solidFill>
                         </a:uFill>
                         <a:latin typeface="Arial"/>
@@ -4279,7 +4708,7 @@
         </p:xfrm>
         <a:graphic>
           <a:graphicData uri="http://schemas.openxmlformats.org/drawingml/2006/chart">
-            <c:chart xmlns:c="http://schemas.openxmlformats.org/drawingml/2006/chart" xmlns:r="http://schemas.openxmlformats.org/officeDocument/2006/relationships" r:id="rId1"/>
+            <c:chart xmlns:c="http://schemas.openxmlformats.org/drawingml/2006/chart" xmlns:r="http://schemas.openxmlformats.org/officeDocument/2006/relationships" r:id="rId2"/>
           </a:graphicData>
         </a:graphic>
       </p:graphicFrame>
@@ -4339,33 +4768,23 @@
           </a:ln>
         </p:spPr>
         <p:txBody>
-          <a:bodyPr lIns="90000" rIns="90000" tIns="45000" bIns="45000"/>
+          <a:bodyPr lIns="90000" tIns="45000" rIns="90000" bIns="45000"/>
+          <a:lstStyle/>
           <a:p>
             <a:r>
-              <a:rPr b="0" lang="ru-RU" sz="7200" spc="-1" strike="noStrike">
+              <a:rPr lang="ru-RU" sz="7200" b="0" strike="noStrike" spc="-1">
                 <a:solidFill>
                   <a:srgbClr val="000000"/>
                 </a:solidFill>
                 <a:uFill>
                   <a:solidFill>
-                    <a:srgbClr val="ffffff"/>
+                    <a:srgbClr val="FFFFFF"/>
                   </a:solidFill>
                 </a:uFill>
                 <a:latin typeface="Arial"/>
               </a:rPr>
               <a:t>Результаты работы программного средства</a:t>
             </a:r>
-            <a:endParaRPr b="0" lang="ru-RU" sz="7200" spc="-1" strike="noStrike">
-              <a:solidFill>
-                <a:srgbClr val="000000"/>
-              </a:solidFill>
-              <a:uFill>
-                <a:solidFill>
-                  <a:srgbClr val="ffffff"/>
-                </a:solidFill>
-              </a:uFill>
-              <a:latin typeface="Arial"/>
-            </a:endParaRPr>
           </a:p>
         </p:txBody>
       </p:sp>
@@ -4377,7 +4796,7 @@
         </p:nvSpPr>
         <p:spPr>
           <a:xfrm>
-            <a:off x="10008000" y="7776000"/>
+            <a:off x="10259460" y="8075520"/>
             <a:ext cx="9414720" cy="459360"/>
           </a:xfrm>
           <a:prstGeom prst="rect">
@@ -4389,61 +4808,65 @@
           </a:ln>
         </p:spPr>
         <p:txBody>
-          <a:bodyPr lIns="90000" rIns="90000" tIns="45000" bIns="45000"/>
+          <a:bodyPr lIns="90000" tIns="45000" rIns="90000" bIns="45000"/>
+          <a:lstStyle/>
           <a:p>
             <a:r>
-              <a:rPr b="0" lang="ru-RU" sz="2600" spc="-1" strike="noStrike">
+              <a:rPr lang="ru-RU" sz="2600" b="0" strike="noStrike" spc="-1" dirty="0" smtClean="0">
                 <a:solidFill>
                   <a:srgbClr val="000000"/>
                 </a:solidFill>
                 <a:uFill>
                   <a:solidFill>
-                    <a:srgbClr val="ffffff"/>
+                    <a:srgbClr val="FFFFFF"/>
                   </a:solidFill>
                 </a:uFill>
                 <a:latin typeface="Arial"/>
               </a:rPr>
-              <a:t>Рисунок 1 — Отклонения </a:t>
+              <a:t>Рис</a:t>
             </a:r>
             <a:r>
-              <a:rPr b="0" lang="ru-RU" sz="2600" spc="-1" strike="noStrike">
+              <a:rPr lang="en-US" sz="2600" b="0" strike="noStrike" spc="-1" dirty="0" smtClean="0">
                 <a:solidFill>
                   <a:srgbClr val="000000"/>
                 </a:solidFill>
                 <a:uFill>
                   <a:solidFill>
-                    <a:srgbClr val="ffffff"/>
+                    <a:srgbClr val="FFFFFF"/>
                   </a:solidFill>
                 </a:uFill>
                 <a:latin typeface="Arial"/>
               </a:rPr>
-              <a:t>признаков</a:t>
+              <a:t>.</a:t>
             </a:r>
             <a:r>
-              <a:rPr b="0" lang="ru-RU" sz="2600" spc="-1" strike="noStrike">
+              <a:rPr lang="ru-RU" sz="2600" b="0" strike="noStrike" spc="-1" dirty="0" smtClean="0">
                 <a:solidFill>
                   <a:srgbClr val="000000"/>
                 </a:solidFill>
                 <a:uFill>
                   <a:solidFill>
-                    <a:srgbClr val="ffffff"/>
+                    <a:srgbClr val="FFFFFF"/>
                   </a:solidFill>
                 </a:uFill>
                 <a:latin typeface="Arial"/>
               </a:rPr>
-              <a:t> от обучающей выборки</a:t>
+              <a:t> </a:t>
             </a:r>
-            <a:endParaRPr b="0" lang="ru-RU" sz="2600" spc="-1" strike="noStrike">
-              <a:solidFill>
-                <a:srgbClr val="000000"/>
-              </a:solidFill>
-              <a:uFill>
+            <a:r>
+              <a:rPr lang="ru-RU" sz="2600" b="0" strike="noStrike" spc="-1" dirty="0">
                 <a:solidFill>
-                  <a:srgbClr val="ffffff"/>
+                  <a:srgbClr val="000000"/>
                 </a:solidFill>
-              </a:uFill>
-              <a:latin typeface="Arial"/>
-            </a:endParaRPr>
+                <a:uFill>
+                  <a:solidFill>
+                    <a:srgbClr val="FFFFFF"/>
+                  </a:solidFill>
+                </a:uFill>
+                <a:latin typeface="Arial"/>
+              </a:rPr>
+              <a:t>1 — Отклонения признаков от обучающей выборки</a:t>
+            </a:r>
           </a:p>
         </p:txBody>
       </p:sp>
@@ -4467,38 +4890,31 @@
           </a:ln>
         </p:spPr>
         <p:txBody>
-          <a:bodyPr lIns="90000" rIns="90000" tIns="45000" bIns="45000"/>
+          <a:bodyPr lIns="90000" tIns="45000" rIns="90000" bIns="45000"/>
+          <a:lstStyle/>
           <a:p>
             <a:r>
-              <a:rPr b="0" lang="ru-RU" sz="2600" spc="-1" strike="noStrike">
+              <a:rPr lang="ru-RU" sz="2600" b="0" strike="noStrike" spc="-1">
                 <a:solidFill>
                   <a:srgbClr val="000000"/>
                 </a:solidFill>
                 <a:uFill>
                   <a:solidFill>
-                    <a:srgbClr val="ffffff"/>
+                    <a:srgbClr val="FFFFFF"/>
                   </a:solidFill>
                 </a:uFill>
                 <a:latin typeface="Arial"/>
               </a:rPr>
               <a:t>Рис. 2 — Распределие образцов по классам в обучающей выборке</a:t>
             </a:r>
-            <a:endParaRPr b="0" lang="ru-RU" sz="2600" spc="-1" strike="noStrike">
-              <a:solidFill>
-                <a:srgbClr val="000000"/>
-              </a:solidFill>
-              <a:uFill>
-                <a:solidFill>
-                  <a:srgbClr val="ffffff"/>
-                </a:solidFill>
-              </a:uFill>
-              <a:latin typeface="Arial"/>
-            </a:endParaRPr>
           </a:p>
         </p:txBody>
       </p:sp>
     </p:spTree>
   </p:cSld>
+  <p:clrMapOvr>
+    <a:masterClrMapping/>
+  </p:clrMapOvr>
   <p:timing>
     <p:tnLst>
       <p:par>
@@ -4507,14 +4923,14 @@
             <p:seq>
               <p:cTn id="2" nodeType="mainSeq"/>
               <p:prevCondLst>
-                <p:cond delay="0" evt="onPrev">
+                <p:cond evt="onPrev" delay="0">
                   <p:tgtEl>
                     <p:sldTgt/>
                   </p:tgtEl>
                 </p:cond>
               </p:prevCondLst>
               <p:nextCondLst>
-                <p:cond delay="0" evt="onNext">
+                <p:cond evt="onNext" delay="0">
                   <p:tgtEl>
                     <p:sldTgt/>
                   </p:tgtEl>
@@ -4749,5 +5165,7 @@
       </a:bgFillStyleLst>
     </a:fmtScheme>
   </a:themeElements>
+  <a:objectDefaults/>
+  <a:extraClrSchemeLst/>
 </a:theme>
 </file>
</xml_diff>